<commit_message>
updated the readme and sketch to aggregate based on school size
</commit_message>
<xml_diff>
--- a/images/sketch_of_college_scorecard.pptx
+++ b/images/sketch_of_college_scorecard.pptx
@@ -104,17 +104,18 @@
       </a:defRPr>
     </a:lvl9pPr>
   </p:defaultTextStyle>
+  <p:extLst>
+    <p:ext uri="{EFAFB233-063F-42B5-8137-9DF3F51BA10A}">
+      <p15:sldGuideLst xmlns:p15="http://schemas.microsoft.com/office/powerpoint/2012/main"/>
+    </p:ext>
+  </p:extLst>
 </p:presentation>
 </file>
 
 <file path=ppt/commentAuthors.xml><?xml version="1.0" encoding="utf-8"?>
 <p:cmAuthorLst xmlns:a="http://schemas.openxmlformats.org/drawingml/2006/main" xmlns:r="http://schemas.openxmlformats.org/officeDocument/2006/relationships" xmlns:p="http://schemas.openxmlformats.org/presentationml/2006/main">
   <p:cmAuthor id="1" name="Sarah Watts" initials="SW" lastIdx="1" clrIdx="0">
-    <p:extLst>
-      <p:ext uri="{19B8F6BF-5375-455C-9EA6-DF929625EA0E}">
-        <p15:presenceInfo xmlns:p15="http://schemas.microsoft.com/office/powerpoint/2012/main" userId="" providerId=""/>
-      </p:ext>
-    </p:extLst>
+    <p:extLst/>
   </p:cmAuthor>
 </p:cmAuthorLst>
 </file>
@@ -250,7 +251,7 @@
           <a:p>
             <a:fld id="{2AC6034D-18FF-1D4A-AE20-BE0D231E5063}" type="datetimeFigureOut">
               <a:rPr lang="en-US" smtClean="0"/>
-              <a:t>1/7/19</a:t>
+              <a:t>1/12/19</a:t>
             </a:fld>
             <a:endParaRPr lang="en-US"/>
           </a:p>
@@ -420,7 +421,7 @@
           <a:p>
             <a:fld id="{2AC6034D-18FF-1D4A-AE20-BE0D231E5063}" type="datetimeFigureOut">
               <a:rPr lang="en-US" smtClean="0"/>
-              <a:t>1/7/19</a:t>
+              <a:t>1/12/19</a:t>
             </a:fld>
             <a:endParaRPr lang="en-US"/>
           </a:p>
@@ -600,7 +601,7 @@
           <a:p>
             <a:fld id="{2AC6034D-18FF-1D4A-AE20-BE0D231E5063}" type="datetimeFigureOut">
               <a:rPr lang="en-US" smtClean="0"/>
-              <a:t>1/7/19</a:t>
+              <a:t>1/12/19</a:t>
             </a:fld>
             <a:endParaRPr lang="en-US"/>
           </a:p>
@@ -770,7 +771,7 @@
           <a:p>
             <a:fld id="{2AC6034D-18FF-1D4A-AE20-BE0D231E5063}" type="datetimeFigureOut">
               <a:rPr lang="en-US" smtClean="0"/>
-              <a:t>1/7/19</a:t>
+              <a:t>1/12/19</a:t>
             </a:fld>
             <a:endParaRPr lang="en-US"/>
           </a:p>
@@ -1016,7 +1017,7 @@
           <a:p>
             <a:fld id="{2AC6034D-18FF-1D4A-AE20-BE0D231E5063}" type="datetimeFigureOut">
               <a:rPr lang="en-US" smtClean="0"/>
-              <a:t>1/7/19</a:t>
+              <a:t>1/12/19</a:t>
             </a:fld>
             <a:endParaRPr lang="en-US"/>
           </a:p>
@@ -1248,7 +1249,7 @@
           <a:p>
             <a:fld id="{2AC6034D-18FF-1D4A-AE20-BE0D231E5063}" type="datetimeFigureOut">
               <a:rPr lang="en-US" smtClean="0"/>
-              <a:t>1/7/19</a:t>
+              <a:t>1/12/19</a:t>
             </a:fld>
             <a:endParaRPr lang="en-US"/>
           </a:p>
@@ -1615,7 +1616,7 @@
           <a:p>
             <a:fld id="{2AC6034D-18FF-1D4A-AE20-BE0D231E5063}" type="datetimeFigureOut">
               <a:rPr lang="en-US" smtClean="0"/>
-              <a:t>1/7/19</a:t>
+              <a:t>1/12/19</a:t>
             </a:fld>
             <a:endParaRPr lang="en-US"/>
           </a:p>
@@ -1733,7 +1734,7 @@
           <a:p>
             <a:fld id="{2AC6034D-18FF-1D4A-AE20-BE0D231E5063}" type="datetimeFigureOut">
               <a:rPr lang="en-US" smtClean="0"/>
-              <a:t>1/7/19</a:t>
+              <a:t>1/12/19</a:t>
             </a:fld>
             <a:endParaRPr lang="en-US"/>
           </a:p>
@@ -1828,7 +1829,7 @@
           <a:p>
             <a:fld id="{2AC6034D-18FF-1D4A-AE20-BE0D231E5063}" type="datetimeFigureOut">
               <a:rPr lang="en-US" smtClean="0"/>
-              <a:t>1/7/19</a:t>
+              <a:t>1/12/19</a:t>
             </a:fld>
             <a:endParaRPr lang="en-US"/>
           </a:p>
@@ -2105,7 +2106,7 @@
           <a:p>
             <a:fld id="{2AC6034D-18FF-1D4A-AE20-BE0D231E5063}" type="datetimeFigureOut">
               <a:rPr lang="en-US" smtClean="0"/>
-              <a:t>1/7/19</a:t>
+              <a:t>1/12/19</a:t>
             </a:fld>
             <a:endParaRPr lang="en-US"/>
           </a:p>
@@ -2358,7 +2359,7 @@
           <a:p>
             <a:fld id="{2AC6034D-18FF-1D4A-AE20-BE0D231E5063}" type="datetimeFigureOut">
               <a:rPr lang="en-US" smtClean="0"/>
-              <a:t>1/7/19</a:t>
+              <a:t>1/12/19</a:t>
             </a:fld>
             <a:endParaRPr lang="en-US"/>
           </a:p>
@@ -2571,7 +2572,7 @@
           <a:p>
             <a:fld id="{2AC6034D-18FF-1D4A-AE20-BE0D231E5063}" type="datetimeFigureOut">
               <a:rPr lang="en-US" smtClean="0"/>
-              <a:t>1/7/19</a:t>
+              <a:t>1/12/19</a:t>
             </a:fld>
             <a:endParaRPr lang="en-US"/>
           </a:p>
@@ -2978,6 +2979,52 @@
       </p:grpSpPr>
       <p:sp>
         <p:nvSpPr>
+          <p:cNvPr id="102" name="Rectangle 101"/>
+          <p:cNvSpPr/>
+          <p:nvPr/>
+        </p:nvSpPr>
+        <p:spPr>
+          <a:xfrm>
+            <a:off x="6206185" y="2118119"/>
+            <a:ext cx="360947" cy="859663"/>
+          </a:xfrm>
+          <a:prstGeom prst="rect">
+            <a:avLst/>
+          </a:prstGeom>
+          <a:solidFill>
+            <a:srgbClr val="7030A0"/>
+          </a:solidFill>
+          <a:ln>
+            <a:noFill/>
+          </a:ln>
+        </p:spPr>
+        <p:style>
+          <a:lnRef idx="2">
+            <a:schemeClr val="accent1">
+              <a:shade val="50000"/>
+            </a:schemeClr>
+          </a:lnRef>
+          <a:fillRef idx="1">
+            <a:schemeClr val="accent1"/>
+          </a:fillRef>
+          <a:effectRef idx="0">
+            <a:schemeClr val="accent1"/>
+          </a:effectRef>
+          <a:fontRef idx="minor">
+            <a:schemeClr val="lt1"/>
+          </a:fontRef>
+        </p:style>
+        <p:txBody>
+          <a:bodyPr rtlCol="0" anchor="ctr"/>
+          <a:lstStyle/>
+          <a:p>
+            <a:pPr algn="ctr"/>
+            <a:endParaRPr lang="en-US"/>
+          </a:p>
+        </p:txBody>
+      </p:sp>
+      <p:sp>
+        <p:nvSpPr>
           <p:cNvPr id="4" name="Rectangle 3"/>
           <p:cNvSpPr/>
           <p:nvPr/>
@@ -3032,8 +3079,8 @@
         </p:nvSpPr>
         <p:spPr>
           <a:xfrm>
-            <a:off x="4521895" y="636608"/>
-            <a:ext cx="2397950" cy="420324"/>
+            <a:off x="4521895" y="636607"/>
+            <a:ext cx="2397950" cy="520287"/>
           </a:xfrm>
           <a:prstGeom prst="rect">
             <a:avLst/>
@@ -3066,7 +3113,58 @@
                 <a:ea typeface="Arial" charset="0"/>
                 <a:cs typeface="Arial" charset="0"/>
               </a:rPr>
-              <a:t>Number of Students</a:t>
+              <a:t>Total </a:t>
+            </a:r>
+            <a:r>
+              <a:rPr lang="en-US" sz="1400" dirty="0" smtClean="0">
+                <a:latin typeface="Arial" charset="0"/>
+                <a:ea typeface="Arial" charset="0"/>
+                <a:cs typeface="Arial" charset="0"/>
+              </a:rPr>
+              <a:t>Number of </a:t>
+            </a:r>
+            <a:r>
+              <a:rPr lang="en-US" sz="1400" dirty="0">
+                <a:latin typeface="Arial" charset="0"/>
+                <a:ea typeface="Arial" charset="0"/>
+                <a:cs typeface="Arial" charset="0"/>
+              </a:rPr>
+              <a:t>s</a:t>
+            </a:r>
+            <a:r>
+              <a:rPr lang="en-US" sz="1400" dirty="0" smtClean="0">
+                <a:latin typeface="Arial" charset="0"/>
+                <a:ea typeface="Arial" charset="0"/>
+                <a:cs typeface="Arial" charset="0"/>
+              </a:rPr>
+              <a:t>chools </a:t>
+            </a:r>
+          </a:p>
+          <a:p>
+            <a:pPr algn="ctr"/>
+            <a:r>
+              <a:rPr lang="en-US" sz="1400" dirty="0" smtClean="0">
+                <a:latin typeface="Arial" charset="0"/>
+                <a:ea typeface="Arial" charset="0"/>
+                <a:cs typeface="Arial" charset="0"/>
+              </a:rPr>
+              <a:t>by </a:t>
+            </a:r>
+            <a:r>
+              <a:rPr lang="en-US" sz="1400" dirty="0">
+                <a:latin typeface="Arial" charset="0"/>
+                <a:ea typeface="Arial" charset="0"/>
+                <a:cs typeface="Arial" charset="0"/>
+              </a:rPr>
+              <a:t>s</a:t>
+            </a:r>
+            <a:r>
+              <a:rPr lang="en-US" sz="1400" dirty="0" smtClean="0">
+                <a:latin typeface="Arial" charset="0"/>
+                <a:ea typeface="Arial" charset="0"/>
+                <a:cs typeface="Arial" charset="0"/>
+              </a:rPr>
+              <a:t>ize</a:t>
             </a:r>
             <a:endParaRPr lang="en-US" sz="1400" dirty="0">
               <a:latin typeface="Arial" charset="0"/>
@@ -3104,23 +3202,8 @@
                 <a:ea typeface="Arial" charset="0"/>
                 <a:cs typeface="Arial" charset="0"/>
               </a:rPr>
-              <a:t>Ethnicity’s Impact: </a:t>
-            </a:r>
-          </a:p>
-          <a:p>
-            <a:r>
-              <a:rPr lang="en-US" sz="2000" dirty="0" smtClean="0">
-                <a:latin typeface="Arial" charset="0"/>
-                <a:ea typeface="Arial" charset="0"/>
-                <a:cs typeface="Arial" charset="0"/>
-              </a:rPr>
-              <a:t>Higher education and beyond</a:t>
-            </a:r>
-            <a:endParaRPr lang="en-US" sz="2000" dirty="0">
-              <a:latin typeface="Arial" charset="0"/>
-              <a:ea typeface="Arial" charset="0"/>
-              <a:cs typeface="Arial" charset="0"/>
-            </a:endParaRPr>
+              <a:t>Impact of school size on higher education and beyond (USA)</a:t>
+            </a:r>
           </a:p>
         </p:txBody>
       </p:sp>
@@ -3195,14 +3278,14 @@
       </p:sp>
       <p:sp>
         <p:nvSpPr>
-          <p:cNvPr id="12" name="TextBox 11"/>
+          <p:cNvPr id="13" name="TextBox 12"/>
           <p:cNvSpPr txBox="1"/>
           <p:nvPr/>
         </p:nvSpPr>
         <p:spPr>
           <a:xfrm>
-            <a:off x="726508" y="2387279"/>
-            <a:ext cx="809837" cy="338554"/>
+            <a:off x="771170" y="2309807"/>
+            <a:ext cx="663964" cy="338554"/>
           </a:xfrm>
           <a:prstGeom prst="rect">
             <a:avLst/>
@@ -3221,264 +3304,7 @@
                 <a:ea typeface="Arial" charset="0"/>
                 <a:cs typeface="Arial" charset="0"/>
               </a:rPr>
-              <a:t>School</a:t>
-            </a:r>
-            <a:endParaRPr lang="en-US" sz="1600" dirty="0">
-              <a:latin typeface="Arial" charset="0"/>
-              <a:ea typeface="Arial" charset="0"/>
-              <a:cs typeface="Arial" charset="0"/>
-            </a:endParaRPr>
-          </a:p>
-        </p:txBody>
-      </p:sp>
-      <p:sp>
-        <p:nvSpPr>
-          <p:cNvPr id="13" name="TextBox 12"/>
-          <p:cNvSpPr txBox="1"/>
-          <p:nvPr/>
-        </p:nvSpPr>
-        <p:spPr>
-          <a:xfrm>
-            <a:off x="723302" y="4280404"/>
-            <a:ext cx="663964" cy="338554"/>
-          </a:xfrm>
-          <a:prstGeom prst="rect">
-            <a:avLst/>
-          </a:prstGeom>
-          <a:noFill/>
-        </p:spPr>
-        <p:txBody>
-          <a:bodyPr wrap="none" rtlCol="0">
-            <a:spAutoFit/>
-          </a:bodyPr>
-          <a:lstStyle/>
-          <a:p>
-            <a:r>
-              <a:rPr lang="en-US" sz="1600" smtClean="0">
-                <a:latin typeface="Arial" charset="0"/>
-                <a:ea typeface="Arial" charset="0"/>
-                <a:cs typeface="Arial" charset="0"/>
-              </a:rPr>
               <a:t>State</a:t>
-            </a:r>
-            <a:endParaRPr lang="en-US" sz="1600">
-              <a:latin typeface="Arial" charset="0"/>
-              <a:ea typeface="Arial" charset="0"/>
-              <a:cs typeface="Arial" charset="0"/>
-            </a:endParaRPr>
-          </a:p>
-        </p:txBody>
-      </p:sp>
-      <p:sp>
-        <p:nvSpPr>
-          <p:cNvPr id="14" name="TextBox 13"/>
-          <p:cNvSpPr txBox="1"/>
-          <p:nvPr/>
-        </p:nvSpPr>
-        <p:spPr>
-          <a:xfrm>
-            <a:off x="735613" y="3326071"/>
-            <a:ext cx="598818" cy="338554"/>
-          </a:xfrm>
-          <a:prstGeom prst="rect">
-            <a:avLst/>
-          </a:prstGeom>
-          <a:noFill/>
-        </p:spPr>
-        <p:txBody>
-          <a:bodyPr wrap="none" rtlCol="0">
-            <a:spAutoFit/>
-          </a:bodyPr>
-          <a:lstStyle/>
-          <a:p>
-            <a:r>
-              <a:rPr lang="en-US" sz="1600" dirty="0" smtClean="0">
-                <a:latin typeface="Arial" charset="0"/>
-                <a:ea typeface="Arial" charset="0"/>
-                <a:cs typeface="Arial" charset="0"/>
-              </a:rPr>
-              <a:t>Year</a:t>
-            </a:r>
-            <a:endParaRPr lang="en-US" sz="1600" dirty="0">
-              <a:latin typeface="Arial" charset="0"/>
-              <a:ea typeface="Arial" charset="0"/>
-              <a:cs typeface="Arial" charset="0"/>
-            </a:endParaRPr>
-          </a:p>
-        </p:txBody>
-      </p:sp>
-      <p:grpSp>
-        <p:nvGrpSpPr>
-          <p:cNvPr id="18" name="Group 17"/>
-          <p:cNvGrpSpPr/>
-          <p:nvPr/>
-        </p:nvGrpSpPr>
-        <p:grpSpPr>
-          <a:xfrm>
-            <a:off x="723302" y="3686475"/>
-            <a:ext cx="2662177" cy="338554"/>
-            <a:chOff x="5197033" y="2446215"/>
-            <a:chExt cx="2662177" cy="338554"/>
-          </a:xfrm>
-          <a:solidFill>
-            <a:schemeClr val="bg1"/>
-          </a:solidFill>
-        </p:grpSpPr>
-        <p:sp>
-          <p:nvSpPr>
-            <p:cNvPr id="15" name="Rectangle 14"/>
-            <p:cNvSpPr/>
-            <p:nvPr/>
-          </p:nvSpPr>
-          <p:spPr>
-            <a:xfrm>
-              <a:off x="5197033" y="2446215"/>
-              <a:ext cx="2662177" cy="338554"/>
-            </a:xfrm>
-            <a:prstGeom prst="rect">
-              <a:avLst/>
-            </a:prstGeom>
-            <a:grpFill/>
-          </p:spPr>
-          <p:style>
-            <a:lnRef idx="2">
-              <a:schemeClr val="accent1">
-                <a:shade val="50000"/>
-              </a:schemeClr>
-            </a:lnRef>
-            <a:fillRef idx="1">
-              <a:schemeClr val="accent1"/>
-            </a:fillRef>
-            <a:effectRef idx="0">
-              <a:schemeClr val="accent1"/>
-            </a:effectRef>
-            <a:fontRef idx="minor">
-              <a:schemeClr val="lt1"/>
-            </a:fontRef>
-          </p:style>
-          <p:txBody>
-            <a:bodyPr rtlCol="0" anchor="ctr"/>
-            <a:lstStyle/>
-            <a:p>
-              <a:pPr algn="ctr"/>
-              <a:endParaRPr lang="en-US"/>
-            </a:p>
-          </p:txBody>
-        </p:sp>
-        <p:sp>
-          <p:nvSpPr>
-            <p:cNvPr id="16" name="Rectangle 15"/>
-            <p:cNvSpPr/>
-            <p:nvPr/>
-          </p:nvSpPr>
-          <p:spPr>
-            <a:xfrm>
-              <a:off x="7384648" y="2446215"/>
-              <a:ext cx="474562" cy="338554"/>
-            </a:xfrm>
-            <a:prstGeom prst="rect">
-              <a:avLst/>
-            </a:prstGeom>
-            <a:grpFill/>
-          </p:spPr>
-          <p:style>
-            <a:lnRef idx="2">
-              <a:schemeClr val="accent1">
-                <a:shade val="50000"/>
-              </a:schemeClr>
-            </a:lnRef>
-            <a:fillRef idx="1">
-              <a:schemeClr val="accent1"/>
-            </a:fillRef>
-            <a:effectRef idx="0">
-              <a:schemeClr val="accent1"/>
-            </a:effectRef>
-            <a:fontRef idx="minor">
-              <a:schemeClr val="lt1"/>
-            </a:fontRef>
-          </p:style>
-          <p:txBody>
-            <a:bodyPr rtlCol="0" anchor="ctr"/>
-            <a:lstStyle/>
-            <a:p>
-              <a:pPr algn="ctr"/>
-              <a:endParaRPr lang="en-US"/>
-            </a:p>
-          </p:txBody>
-        </p:sp>
-        <p:sp>
-          <p:nvSpPr>
-            <p:cNvPr id="17" name="Triangle 16"/>
-            <p:cNvSpPr/>
-            <p:nvPr/>
-          </p:nvSpPr>
-          <p:spPr>
-            <a:xfrm flipV="1">
-              <a:off x="7483032" y="2534855"/>
-              <a:ext cx="277793" cy="154041"/>
-            </a:xfrm>
-            <a:prstGeom prst="triangle">
-              <a:avLst/>
-            </a:prstGeom>
-            <a:solidFill>
-              <a:schemeClr val="accent1"/>
-            </a:solidFill>
-          </p:spPr>
-          <p:style>
-            <a:lnRef idx="2">
-              <a:schemeClr val="accent1">
-                <a:shade val="50000"/>
-              </a:schemeClr>
-            </a:lnRef>
-            <a:fillRef idx="1">
-              <a:schemeClr val="accent1"/>
-            </a:fillRef>
-            <a:effectRef idx="0">
-              <a:schemeClr val="accent1"/>
-            </a:effectRef>
-            <a:fontRef idx="minor">
-              <a:schemeClr val="lt1"/>
-            </a:fontRef>
-          </p:style>
-          <p:txBody>
-            <a:bodyPr rtlCol="0" anchor="ctr"/>
-            <a:lstStyle/>
-            <a:p>
-              <a:pPr algn="ctr"/>
-              <a:endParaRPr lang="en-US"/>
-            </a:p>
-          </p:txBody>
-        </p:sp>
-      </p:grpSp>
-      <p:sp>
-        <p:nvSpPr>
-          <p:cNvPr id="19" name="TextBox 18"/>
-          <p:cNvSpPr txBox="1"/>
-          <p:nvPr/>
-        </p:nvSpPr>
-        <p:spPr>
-          <a:xfrm>
-            <a:off x="822014" y="3682858"/>
-            <a:ext cx="639919" cy="338554"/>
-          </a:xfrm>
-          <a:prstGeom prst="rect">
-            <a:avLst/>
-          </a:prstGeom>
-          <a:noFill/>
-        </p:spPr>
-        <p:txBody>
-          <a:bodyPr wrap="none" rtlCol="0">
-            <a:spAutoFit/>
-          </a:bodyPr>
-          <a:lstStyle/>
-          <a:p>
-            <a:r>
-              <a:rPr lang="en-US" sz="1600" dirty="0" smtClean="0">
-                <a:latin typeface="Arial" charset="0"/>
-                <a:ea typeface="Arial" charset="0"/>
-                <a:cs typeface="Arial" charset="0"/>
-              </a:rPr>
-              <a:t>2019</a:t>
             </a:r>
             <a:endParaRPr lang="en-US" sz="1600" dirty="0">
               <a:latin typeface="Arial" charset="0"/>
@@ -3496,7 +3322,7 @@
         </p:nvGrpSpPr>
         <p:grpSpPr>
           <a:xfrm>
-            <a:off x="737696" y="4618958"/>
+            <a:off x="771170" y="2669623"/>
             <a:ext cx="2662177" cy="338554"/>
             <a:chOff x="5197033" y="2446215"/>
             <a:chExt cx="2662177" cy="338554"/>
@@ -3639,7 +3465,7 @@
         </p:nvSpPr>
         <p:spPr>
           <a:xfrm>
-            <a:off x="822014" y="4588180"/>
+            <a:off x="855488" y="2638845"/>
             <a:ext cx="1159292" cy="369332"/>
           </a:xfrm>
           <a:prstGeom prst="rect">
@@ -3665,182 +3491,6 @@
               <a:ea typeface="Arial" charset="0"/>
               <a:cs typeface="Arial" charset="0"/>
             </a:endParaRPr>
-          </a:p>
-        </p:txBody>
-      </p:sp>
-      <p:grpSp>
-        <p:nvGrpSpPr>
-          <p:cNvPr id="26" name="Group 25"/>
-          <p:cNvGrpSpPr/>
-          <p:nvPr/>
-        </p:nvGrpSpPr>
-        <p:grpSpPr>
-          <a:xfrm>
-            <a:off x="737695" y="2753991"/>
-            <a:ext cx="2662177" cy="338554"/>
-            <a:chOff x="5197033" y="2446215"/>
-            <a:chExt cx="2662177" cy="338554"/>
-          </a:xfrm>
-          <a:solidFill>
-            <a:schemeClr val="bg1"/>
-          </a:solidFill>
-        </p:grpSpPr>
-        <p:sp>
-          <p:nvSpPr>
-            <p:cNvPr id="27" name="Rectangle 26"/>
-            <p:cNvSpPr/>
-            <p:nvPr/>
-          </p:nvSpPr>
-          <p:spPr>
-            <a:xfrm>
-              <a:off x="5197033" y="2446215"/>
-              <a:ext cx="2662177" cy="338554"/>
-            </a:xfrm>
-            <a:prstGeom prst="rect">
-              <a:avLst/>
-            </a:prstGeom>
-            <a:grpFill/>
-          </p:spPr>
-          <p:style>
-            <a:lnRef idx="2">
-              <a:schemeClr val="accent1">
-                <a:shade val="50000"/>
-              </a:schemeClr>
-            </a:lnRef>
-            <a:fillRef idx="1">
-              <a:schemeClr val="accent1"/>
-            </a:fillRef>
-            <a:effectRef idx="0">
-              <a:schemeClr val="accent1"/>
-            </a:effectRef>
-            <a:fontRef idx="minor">
-              <a:schemeClr val="lt1"/>
-            </a:fontRef>
-          </p:style>
-          <p:txBody>
-            <a:bodyPr rtlCol="0" anchor="ctr"/>
-            <a:lstStyle/>
-            <a:p>
-              <a:pPr algn="ctr"/>
-              <a:endParaRPr lang="en-US"/>
-            </a:p>
-          </p:txBody>
-        </p:sp>
-        <p:sp>
-          <p:nvSpPr>
-            <p:cNvPr id="28" name="Rectangle 27"/>
-            <p:cNvSpPr/>
-            <p:nvPr/>
-          </p:nvSpPr>
-          <p:spPr>
-            <a:xfrm>
-              <a:off x="7384648" y="2446215"/>
-              <a:ext cx="474562" cy="338554"/>
-            </a:xfrm>
-            <a:prstGeom prst="rect">
-              <a:avLst/>
-            </a:prstGeom>
-            <a:grpFill/>
-          </p:spPr>
-          <p:style>
-            <a:lnRef idx="2">
-              <a:schemeClr val="accent1">
-                <a:shade val="50000"/>
-              </a:schemeClr>
-            </a:lnRef>
-            <a:fillRef idx="1">
-              <a:schemeClr val="accent1"/>
-            </a:fillRef>
-            <a:effectRef idx="0">
-              <a:schemeClr val="accent1"/>
-            </a:effectRef>
-            <a:fontRef idx="minor">
-              <a:schemeClr val="lt1"/>
-            </a:fontRef>
-          </p:style>
-          <p:txBody>
-            <a:bodyPr rtlCol="0" anchor="ctr"/>
-            <a:lstStyle/>
-            <a:p>
-              <a:pPr algn="ctr"/>
-              <a:endParaRPr lang="en-US"/>
-            </a:p>
-          </p:txBody>
-        </p:sp>
-        <p:sp>
-          <p:nvSpPr>
-            <p:cNvPr id="29" name="Triangle 28"/>
-            <p:cNvSpPr/>
-            <p:nvPr/>
-          </p:nvSpPr>
-          <p:spPr>
-            <a:xfrm flipV="1">
-              <a:off x="7483032" y="2534855"/>
-              <a:ext cx="277793" cy="154041"/>
-            </a:xfrm>
-            <a:prstGeom prst="triangle">
-              <a:avLst/>
-            </a:prstGeom>
-            <a:solidFill>
-              <a:schemeClr val="accent1"/>
-            </a:solidFill>
-          </p:spPr>
-          <p:style>
-            <a:lnRef idx="2">
-              <a:schemeClr val="accent1">
-                <a:shade val="50000"/>
-              </a:schemeClr>
-            </a:lnRef>
-            <a:fillRef idx="1">
-              <a:schemeClr val="accent1"/>
-            </a:fillRef>
-            <a:effectRef idx="0">
-              <a:schemeClr val="accent1"/>
-            </a:effectRef>
-            <a:fontRef idx="minor">
-              <a:schemeClr val="lt1"/>
-            </a:fontRef>
-          </p:style>
-          <p:txBody>
-            <a:bodyPr rtlCol="0" anchor="ctr"/>
-            <a:lstStyle/>
-            <a:p>
-              <a:pPr algn="ctr"/>
-              <a:endParaRPr lang="en-US"/>
-            </a:p>
-          </p:txBody>
-        </p:sp>
-      </p:grpSp>
-      <p:sp>
-        <p:nvSpPr>
-          <p:cNvPr id="30" name="Rectangle 29"/>
-          <p:cNvSpPr/>
-          <p:nvPr/>
-        </p:nvSpPr>
-        <p:spPr>
-          <a:xfrm>
-            <a:off x="814449" y="2732142"/>
-            <a:ext cx="441146" cy="369332"/>
-          </a:xfrm>
-          <a:prstGeom prst="rect">
-            <a:avLst/>
-          </a:prstGeom>
-        </p:spPr>
-        <p:txBody>
-          <a:bodyPr wrap="none">
-            <a:spAutoFit/>
-          </a:bodyPr>
-          <a:lstStyle/>
-          <a:p>
-            <a:r>
-              <a:rPr lang="en-US" dirty="0" smtClean="0">
-                <a:latin typeface="Arial" charset="0"/>
-                <a:ea typeface="Arial" charset="0"/>
-                <a:cs typeface="Arial" charset="0"/>
-              </a:rPr>
-              <a:t>All</a:t>
-            </a:r>
-            <a:endParaRPr lang="en-US" dirty="0"/>
           </a:p>
         </p:txBody>
       </p:sp>
@@ -3953,7 +3603,7 @@
         </p:nvSpPr>
         <p:spPr>
           <a:xfrm>
-            <a:off x="7734252" y="3601087"/>
+            <a:off x="7928554" y="3612621"/>
             <a:ext cx="2397950" cy="520289"/>
           </a:xfrm>
           <a:prstGeom prst="rect">
@@ -4218,7 +3868,7 @@
             <a:avLst/>
           </a:prstGeom>
           <a:solidFill>
-            <a:schemeClr val="bg2">
+            <a:schemeClr val="accent2">
               <a:lumMod val="75000"/>
             </a:schemeClr>
           </a:solidFill>
@@ -4259,15 +3909,15 @@
         </p:nvSpPr>
         <p:spPr>
           <a:xfrm>
-            <a:off x="5261408" y="1844206"/>
+            <a:off x="5494649" y="1844205"/>
             <a:ext cx="360947" cy="1133582"/>
           </a:xfrm>
           <a:prstGeom prst="rect">
             <a:avLst/>
           </a:prstGeom>
           <a:solidFill>
-            <a:schemeClr val="bg2">
-              <a:lumMod val="75000"/>
+            <a:schemeClr val="bg1">
+              <a:lumMod val="50000"/>
             </a:schemeClr>
           </a:solidFill>
           <a:ln>
@@ -4299,100 +3949,6 @@
           </a:p>
         </p:txBody>
       </p:sp>
-      <p:sp>
-        <p:nvSpPr>
-          <p:cNvPr id="49" name="Rectangle 48"/>
-          <p:cNvSpPr/>
-          <p:nvPr/>
-        </p:nvSpPr>
-        <p:spPr>
-          <a:xfrm>
-            <a:off x="5798053" y="1392028"/>
-            <a:ext cx="360947" cy="1585759"/>
-          </a:xfrm>
-          <a:prstGeom prst="rect">
-            <a:avLst/>
-          </a:prstGeom>
-          <a:solidFill>
-            <a:schemeClr val="accent1"/>
-          </a:solidFill>
-          <a:ln>
-            <a:noFill/>
-          </a:ln>
-        </p:spPr>
-        <p:style>
-          <a:lnRef idx="2">
-            <a:schemeClr val="accent1">
-              <a:shade val="50000"/>
-            </a:schemeClr>
-          </a:lnRef>
-          <a:fillRef idx="1">
-            <a:schemeClr val="accent1"/>
-          </a:fillRef>
-          <a:effectRef idx="0">
-            <a:schemeClr val="accent1"/>
-          </a:effectRef>
-          <a:fontRef idx="minor">
-            <a:schemeClr val="lt1"/>
-          </a:fontRef>
-        </p:style>
-        <p:txBody>
-          <a:bodyPr rtlCol="0" anchor="ctr"/>
-          <a:lstStyle/>
-          <a:p>
-            <a:pPr algn="ctr"/>
-            <a:endParaRPr lang="en-US"/>
-          </a:p>
-        </p:txBody>
-      </p:sp>
-      <p:sp>
-        <p:nvSpPr>
-          <p:cNvPr id="50" name="Rectangle 49"/>
-          <p:cNvSpPr/>
-          <p:nvPr/>
-        </p:nvSpPr>
-        <p:spPr>
-          <a:xfrm>
-            <a:off x="6355323" y="1844205"/>
-            <a:ext cx="360947" cy="1133581"/>
-          </a:xfrm>
-          <a:prstGeom prst="rect">
-            <a:avLst/>
-          </a:prstGeom>
-          <a:solidFill>
-            <a:schemeClr val="bg2">
-              <a:lumMod val="75000"/>
-            </a:schemeClr>
-          </a:solidFill>
-          <a:ln>
-            <a:noFill/>
-          </a:ln>
-        </p:spPr>
-        <p:style>
-          <a:lnRef idx="2">
-            <a:schemeClr val="accent1">
-              <a:shade val="50000"/>
-            </a:schemeClr>
-          </a:lnRef>
-          <a:fillRef idx="1">
-            <a:schemeClr val="accent1"/>
-          </a:fillRef>
-          <a:effectRef idx="0">
-            <a:schemeClr val="accent1"/>
-          </a:effectRef>
-          <a:fontRef idx="minor">
-            <a:schemeClr val="lt1"/>
-          </a:fontRef>
-        </p:style>
-        <p:txBody>
-          <a:bodyPr rtlCol="0" anchor="ctr"/>
-          <a:lstStyle/>
-          <a:p>
-            <a:pPr algn="ctr"/>
-            <a:endParaRPr lang="en-US"/>
-          </a:p>
-        </p:txBody>
-      </p:sp>
       <p:cxnSp>
         <p:nvCxnSpPr>
           <p:cNvPr id="51" name="Straight Connector 50"/>
@@ -4401,7 +3957,7 @@
         </p:nvCxnSpPr>
         <p:spPr>
           <a:xfrm>
-            <a:off x="7726100" y="4233037"/>
+            <a:off x="7920402" y="4244571"/>
             <a:ext cx="0" cy="1700302"/>
           </a:xfrm>
           <a:prstGeom prst="line">
@@ -4431,7 +3987,7 @@
         </p:nvCxnSpPr>
         <p:spPr>
           <a:xfrm>
-            <a:off x="7726100" y="5942268"/>
+            <a:off x="7920402" y="5953802"/>
             <a:ext cx="2397950" cy="0"/>
           </a:xfrm>
           <a:prstGeom prst="line">
@@ -4455,26 +4011,132 @@
       </p:cxnSp>
       <p:sp>
         <p:nvSpPr>
-          <p:cNvPr id="53" name="Rectangle 52"/>
-          <p:cNvSpPr/>
+          <p:cNvPr id="57" name="TextBox 56"/>
+          <p:cNvSpPr txBox="1"/>
           <p:nvPr/>
         </p:nvSpPr>
         <p:spPr>
           <a:xfrm>
-            <a:off x="7934454" y="4576997"/>
-            <a:ext cx="360947" cy="1365271"/>
+            <a:off x="4628241" y="3001579"/>
+            <a:ext cx="575799" cy="276999"/>
           </a:xfrm>
           <a:prstGeom prst="rect">
             <a:avLst/>
           </a:prstGeom>
-          <a:solidFill>
-            <a:schemeClr val="bg2">
-              <a:lumMod val="75000"/>
-            </a:schemeClr>
-          </a:solidFill>
-          <a:ln>
-            <a:noFill/>
-          </a:ln>
+          <a:noFill/>
+        </p:spPr>
+        <p:txBody>
+          <a:bodyPr wrap="none" rtlCol="0">
+            <a:spAutoFit/>
+          </a:bodyPr>
+          <a:lstStyle/>
+          <a:p>
+            <a:r>
+              <a:rPr lang="en-US" sz="1200" dirty="0" smtClean="0">
+                <a:latin typeface="Arial" charset="0"/>
+                <a:ea typeface="Arial" charset="0"/>
+                <a:cs typeface="Arial" charset="0"/>
+              </a:rPr>
+              <a:t>Large</a:t>
+            </a:r>
+            <a:endParaRPr lang="en-US" sz="1200" dirty="0">
+              <a:latin typeface="Arial" charset="0"/>
+              <a:ea typeface="Arial" charset="0"/>
+              <a:cs typeface="Arial" charset="0"/>
+            </a:endParaRPr>
+          </a:p>
+        </p:txBody>
+      </p:sp>
+      <p:sp>
+        <p:nvSpPr>
+          <p:cNvPr id="58" name="TextBox 57"/>
+          <p:cNvSpPr txBox="1"/>
+          <p:nvPr/>
+        </p:nvSpPr>
+        <p:spPr>
+          <a:xfrm>
+            <a:off x="5296929" y="3001579"/>
+            <a:ext cx="729687" cy="276999"/>
+          </a:xfrm>
+          <a:prstGeom prst="rect">
+            <a:avLst/>
+          </a:prstGeom>
+          <a:noFill/>
+        </p:spPr>
+        <p:txBody>
+          <a:bodyPr wrap="none" rtlCol="0">
+            <a:spAutoFit/>
+          </a:bodyPr>
+          <a:lstStyle/>
+          <a:p>
+            <a:r>
+              <a:rPr lang="en-US" sz="1200" dirty="0" smtClean="0">
+                <a:latin typeface="Arial" charset="0"/>
+                <a:ea typeface="Arial" charset="0"/>
+                <a:cs typeface="Arial" charset="0"/>
+              </a:rPr>
+              <a:t>Medium</a:t>
+            </a:r>
+            <a:endParaRPr lang="en-US" sz="1200" dirty="0">
+              <a:latin typeface="Arial" charset="0"/>
+              <a:ea typeface="Arial" charset="0"/>
+              <a:cs typeface="Arial" charset="0"/>
+            </a:endParaRPr>
+          </a:p>
+        </p:txBody>
+      </p:sp>
+      <p:sp>
+        <p:nvSpPr>
+          <p:cNvPr id="59" name="TextBox 58"/>
+          <p:cNvSpPr txBox="1"/>
+          <p:nvPr/>
+        </p:nvSpPr>
+        <p:spPr>
+          <a:xfrm>
+            <a:off x="6182274" y="2996922"/>
+            <a:ext cx="567784" cy="276999"/>
+          </a:xfrm>
+          <a:prstGeom prst="rect">
+            <a:avLst/>
+          </a:prstGeom>
+          <a:noFill/>
+        </p:spPr>
+        <p:txBody>
+          <a:bodyPr wrap="none" rtlCol="0">
+            <a:spAutoFit/>
+          </a:bodyPr>
+          <a:lstStyle/>
+          <a:p>
+            <a:r>
+              <a:rPr lang="en-US" sz="1200" dirty="0" smtClean="0">
+                <a:latin typeface="Arial" charset="0"/>
+                <a:ea typeface="Arial" charset="0"/>
+                <a:cs typeface="Arial" charset="0"/>
+              </a:rPr>
+              <a:t>Small</a:t>
+            </a:r>
+            <a:endParaRPr lang="en-US" sz="1200" dirty="0">
+              <a:latin typeface="Arial" charset="0"/>
+              <a:ea typeface="Arial" charset="0"/>
+              <a:cs typeface="Arial" charset="0"/>
+            </a:endParaRPr>
+          </a:p>
+        </p:txBody>
+      </p:sp>
+      <p:sp>
+        <p:nvSpPr>
+          <p:cNvPr id="65" name="Rectangle 64"/>
+          <p:cNvSpPr/>
+          <p:nvPr/>
+        </p:nvSpPr>
+        <p:spPr>
+          <a:xfrm>
+            <a:off x="7925981" y="622408"/>
+            <a:ext cx="2397950" cy="520286"/>
+          </a:xfrm>
+          <a:prstGeom prst="rect">
+            <a:avLst/>
+          </a:prstGeom>
         </p:spPr>
         <p:style>
           <a:lnRef idx="2">
@@ -4497,515 +4159,13 @@
           <a:lstStyle/>
           <a:p>
             <a:pPr algn="ctr"/>
-            <a:endParaRPr lang="en-US"/>
-          </a:p>
-        </p:txBody>
-      </p:sp>
-      <p:sp>
-        <p:nvSpPr>
-          <p:cNvPr id="54" name="Rectangle 53"/>
-          <p:cNvSpPr/>
-          <p:nvPr/>
-        </p:nvSpPr>
-        <p:spPr>
-          <a:xfrm>
-            <a:off x="8465613" y="4808684"/>
-            <a:ext cx="360947" cy="1133581"/>
-          </a:xfrm>
-          <a:prstGeom prst="rect">
-            <a:avLst/>
-          </a:prstGeom>
-          <a:solidFill>
-            <a:schemeClr val="bg2">
-              <a:lumMod val="75000"/>
-            </a:schemeClr>
-          </a:solidFill>
-          <a:ln>
-            <a:noFill/>
-          </a:ln>
-        </p:spPr>
-        <p:style>
-          <a:lnRef idx="2">
-            <a:schemeClr val="accent1">
-              <a:shade val="50000"/>
-            </a:schemeClr>
-          </a:lnRef>
-          <a:fillRef idx="1">
-            <a:schemeClr val="accent1"/>
-          </a:fillRef>
-          <a:effectRef idx="0">
-            <a:schemeClr val="accent1"/>
-          </a:effectRef>
-          <a:fontRef idx="minor">
-            <a:schemeClr val="lt1"/>
-          </a:fontRef>
-        </p:style>
-        <p:txBody>
-          <a:bodyPr rtlCol="0" anchor="ctr"/>
-          <a:lstStyle/>
-          <a:p>
-            <a:pPr algn="ctr"/>
-            <a:endParaRPr lang="en-US"/>
-          </a:p>
-        </p:txBody>
-      </p:sp>
-      <p:sp>
-        <p:nvSpPr>
-          <p:cNvPr id="55" name="Rectangle 54"/>
-          <p:cNvSpPr/>
-          <p:nvPr/>
-        </p:nvSpPr>
-        <p:spPr>
-          <a:xfrm>
-            <a:off x="9002258" y="5008433"/>
-            <a:ext cx="360947" cy="933832"/>
-          </a:xfrm>
-          <a:prstGeom prst="rect">
-            <a:avLst/>
-          </a:prstGeom>
-          <a:solidFill>
-            <a:schemeClr val="bg2">
-              <a:lumMod val="75000"/>
-            </a:schemeClr>
-          </a:solidFill>
-          <a:ln>
-            <a:noFill/>
-          </a:ln>
-        </p:spPr>
-        <p:style>
-          <a:lnRef idx="2">
-            <a:schemeClr val="accent1">
-              <a:shade val="50000"/>
-            </a:schemeClr>
-          </a:lnRef>
-          <a:fillRef idx="1">
-            <a:schemeClr val="accent1"/>
-          </a:fillRef>
-          <a:effectRef idx="0">
-            <a:schemeClr val="accent1"/>
-          </a:effectRef>
-          <a:fontRef idx="minor">
-            <a:schemeClr val="lt1"/>
-          </a:fontRef>
-        </p:style>
-        <p:txBody>
-          <a:bodyPr rtlCol="0" anchor="ctr"/>
-          <a:lstStyle/>
-          <a:p>
-            <a:pPr algn="ctr"/>
-            <a:endParaRPr lang="en-US"/>
-          </a:p>
-        </p:txBody>
-      </p:sp>
-      <p:sp>
-        <p:nvSpPr>
-          <p:cNvPr id="56" name="Rectangle 55"/>
-          <p:cNvSpPr/>
-          <p:nvPr/>
-        </p:nvSpPr>
-        <p:spPr>
-          <a:xfrm>
-            <a:off x="9559528" y="4356509"/>
-            <a:ext cx="360947" cy="1585756"/>
-          </a:xfrm>
-          <a:prstGeom prst="rect">
-            <a:avLst/>
-          </a:prstGeom>
-          <a:solidFill>
-            <a:schemeClr val="accent1"/>
-          </a:solidFill>
-          <a:ln>
-            <a:noFill/>
-          </a:ln>
-        </p:spPr>
-        <p:style>
-          <a:lnRef idx="2">
-            <a:schemeClr val="accent1">
-              <a:shade val="50000"/>
-            </a:schemeClr>
-          </a:lnRef>
-          <a:fillRef idx="1">
-            <a:schemeClr val="accent1"/>
-          </a:fillRef>
-          <a:effectRef idx="0">
-            <a:schemeClr val="accent1"/>
-          </a:effectRef>
-          <a:fontRef idx="minor">
-            <a:schemeClr val="lt1"/>
-          </a:fontRef>
-        </p:style>
-        <p:txBody>
-          <a:bodyPr rtlCol="0" anchor="ctr"/>
-          <a:lstStyle/>
-          <a:p>
-            <a:pPr algn="ctr"/>
-            <a:endParaRPr lang="en-US"/>
-          </a:p>
-        </p:txBody>
-      </p:sp>
-      <p:sp>
-        <p:nvSpPr>
-          <p:cNvPr id="57" name="TextBox 56"/>
-          <p:cNvSpPr txBox="1"/>
-          <p:nvPr/>
-        </p:nvSpPr>
-        <p:spPr>
-          <a:xfrm>
-            <a:off x="4628241" y="3001579"/>
-            <a:ext cx="577402" cy="276999"/>
-          </a:xfrm>
-          <a:prstGeom prst="rect">
-            <a:avLst/>
-          </a:prstGeom>
-          <a:noFill/>
-        </p:spPr>
-        <p:txBody>
-          <a:bodyPr wrap="none" rtlCol="0">
-            <a:spAutoFit/>
-          </a:bodyPr>
-          <a:lstStyle/>
-          <a:p>
-            <a:r>
-              <a:rPr lang="en-US" sz="1200" dirty="0" smtClean="0">
-                <a:latin typeface="Arial" charset="0"/>
-                <a:ea typeface="Arial" charset="0"/>
-                <a:cs typeface="Arial" charset="0"/>
-              </a:rPr>
-              <a:t>White</a:t>
-            </a:r>
-            <a:endParaRPr lang="en-US" sz="1200" dirty="0">
-              <a:latin typeface="Arial" charset="0"/>
-              <a:ea typeface="Arial" charset="0"/>
-              <a:cs typeface="Arial" charset="0"/>
-            </a:endParaRPr>
-          </a:p>
-        </p:txBody>
-      </p:sp>
-      <p:sp>
-        <p:nvSpPr>
-          <p:cNvPr id="58" name="TextBox 57"/>
-          <p:cNvSpPr txBox="1"/>
-          <p:nvPr/>
-        </p:nvSpPr>
-        <p:spPr>
-          <a:xfrm>
-            <a:off x="5166583" y="3001579"/>
-            <a:ext cx="559769" cy="276999"/>
-          </a:xfrm>
-          <a:prstGeom prst="rect">
-            <a:avLst/>
-          </a:prstGeom>
-          <a:noFill/>
-        </p:spPr>
-        <p:txBody>
-          <a:bodyPr wrap="none" rtlCol="0">
-            <a:spAutoFit/>
-          </a:bodyPr>
-          <a:lstStyle/>
-          <a:p>
-            <a:r>
-              <a:rPr lang="en-US" sz="1200" dirty="0" smtClean="0">
-                <a:latin typeface="Arial" charset="0"/>
-                <a:ea typeface="Arial" charset="0"/>
-                <a:cs typeface="Arial" charset="0"/>
-              </a:rPr>
-              <a:t>Black</a:t>
-            </a:r>
-            <a:endParaRPr lang="en-US" sz="1200" dirty="0">
-              <a:latin typeface="Arial" charset="0"/>
-              <a:ea typeface="Arial" charset="0"/>
-              <a:cs typeface="Arial" charset="0"/>
-            </a:endParaRPr>
-          </a:p>
-        </p:txBody>
-      </p:sp>
-      <p:sp>
-        <p:nvSpPr>
-          <p:cNvPr id="59" name="TextBox 58"/>
-          <p:cNvSpPr txBox="1"/>
-          <p:nvPr/>
-        </p:nvSpPr>
-        <p:spPr>
-          <a:xfrm>
-            <a:off x="5690498" y="3001579"/>
-            <a:ext cx="567784" cy="276999"/>
-          </a:xfrm>
-          <a:prstGeom prst="rect">
-            <a:avLst/>
-          </a:prstGeom>
-          <a:noFill/>
-        </p:spPr>
-        <p:txBody>
-          <a:bodyPr wrap="none" rtlCol="0">
-            <a:spAutoFit/>
-          </a:bodyPr>
-          <a:lstStyle/>
-          <a:p>
-            <a:r>
-              <a:rPr lang="en-US" sz="1200" dirty="0" smtClean="0">
-                <a:latin typeface="Arial" charset="0"/>
-                <a:ea typeface="Arial" charset="0"/>
-                <a:cs typeface="Arial" charset="0"/>
-              </a:rPr>
-              <a:t>Asian</a:t>
-            </a:r>
-            <a:endParaRPr lang="en-US" sz="1200" dirty="0">
-              <a:latin typeface="Arial" charset="0"/>
-              <a:ea typeface="Arial" charset="0"/>
-              <a:cs typeface="Arial" charset="0"/>
-            </a:endParaRPr>
-          </a:p>
-        </p:txBody>
-      </p:sp>
-      <p:sp>
-        <p:nvSpPr>
-          <p:cNvPr id="60" name="TextBox 59"/>
-          <p:cNvSpPr txBox="1"/>
-          <p:nvPr/>
-        </p:nvSpPr>
-        <p:spPr>
-          <a:xfrm>
-            <a:off x="6222428" y="3001579"/>
-            <a:ext cx="771365" cy="276999"/>
-          </a:xfrm>
-          <a:prstGeom prst="rect">
-            <a:avLst/>
-          </a:prstGeom>
-          <a:noFill/>
-        </p:spPr>
-        <p:txBody>
-          <a:bodyPr wrap="none" rtlCol="0">
-            <a:spAutoFit/>
-          </a:bodyPr>
-          <a:lstStyle/>
-          <a:p>
-            <a:r>
-              <a:rPr lang="en-US" sz="1200" dirty="0" smtClean="0">
-                <a:latin typeface="Arial" charset="0"/>
-                <a:ea typeface="Arial" charset="0"/>
-                <a:cs typeface="Arial" charset="0"/>
-              </a:rPr>
-              <a:t>Hispanic</a:t>
-            </a:r>
-            <a:endParaRPr lang="en-US" sz="1200" dirty="0">
-              <a:latin typeface="Arial" charset="0"/>
-              <a:ea typeface="Arial" charset="0"/>
-              <a:cs typeface="Arial" charset="0"/>
-            </a:endParaRPr>
-          </a:p>
-        </p:txBody>
-      </p:sp>
-      <p:sp>
-        <p:nvSpPr>
-          <p:cNvPr id="61" name="TextBox 60"/>
-          <p:cNvSpPr txBox="1"/>
-          <p:nvPr/>
-        </p:nvSpPr>
-        <p:spPr>
-          <a:xfrm>
-            <a:off x="7818822" y="5976472"/>
-            <a:ext cx="577402" cy="276999"/>
-          </a:xfrm>
-          <a:prstGeom prst="rect">
-            <a:avLst/>
-          </a:prstGeom>
-          <a:noFill/>
-        </p:spPr>
-        <p:txBody>
-          <a:bodyPr wrap="none" rtlCol="0">
-            <a:spAutoFit/>
-          </a:bodyPr>
-          <a:lstStyle/>
-          <a:p>
-            <a:r>
-              <a:rPr lang="en-US" sz="1200" dirty="0" smtClean="0">
-                <a:latin typeface="Arial" charset="0"/>
-                <a:ea typeface="Arial" charset="0"/>
-                <a:cs typeface="Arial" charset="0"/>
-              </a:rPr>
-              <a:t>White</a:t>
-            </a:r>
-            <a:endParaRPr lang="en-US" sz="1200" dirty="0">
-              <a:latin typeface="Arial" charset="0"/>
-              <a:ea typeface="Arial" charset="0"/>
-              <a:cs typeface="Arial" charset="0"/>
-            </a:endParaRPr>
-          </a:p>
-        </p:txBody>
-      </p:sp>
-      <p:sp>
-        <p:nvSpPr>
-          <p:cNvPr id="62" name="TextBox 61"/>
-          <p:cNvSpPr txBox="1"/>
-          <p:nvPr/>
-        </p:nvSpPr>
-        <p:spPr>
-          <a:xfrm>
-            <a:off x="8357164" y="5976472"/>
-            <a:ext cx="559769" cy="276999"/>
-          </a:xfrm>
-          <a:prstGeom prst="rect">
-            <a:avLst/>
-          </a:prstGeom>
-          <a:noFill/>
-        </p:spPr>
-        <p:txBody>
-          <a:bodyPr wrap="none" rtlCol="0">
-            <a:spAutoFit/>
-          </a:bodyPr>
-          <a:lstStyle/>
-          <a:p>
-            <a:r>
-              <a:rPr lang="en-US" sz="1200" dirty="0" smtClean="0">
-                <a:latin typeface="Arial" charset="0"/>
-                <a:ea typeface="Arial" charset="0"/>
-                <a:cs typeface="Arial" charset="0"/>
-              </a:rPr>
-              <a:t>Black</a:t>
-            </a:r>
-            <a:endParaRPr lang="en-US" sz="1200" dirty="0">
-              <a:latin typeface="Arial" charset="0"/>
-              <a:ea typeface="Arial" charset="0"/>
-              <a:cs typeface="Arial" charset="0"/>
-            </a:endParaRPr>
-          </a:p>
-        </p:txBody>
-      </p:sp>
-      <p:sp>
-        <p:nvSpPr>
-          <p:cNvPr id="63" name="TextBox 62"/>
-          <p:cNvSpPr txBox="1"/>
-          <p:nvPr/>
-        </p:nvSpPr>
-        <p:spPr>
-          <a:xfrm>
-            <a:off x="8881079" y="5976472"/>
-            <a:ext cx="567784" cy="276999"/>
-          </a:xfrm>
-          <a:prstGeom prst="rect">
-            <a:avLst/>
-          </a:prstGeom>
-          <a:noFill/>
-        </p:spPr>
-        <p:txBody>
-          <a:bodyPr wrap="none" rtlCol="0">
-            <a:spAutoFit/>
-          </a:bodyPr>
-          <a:lstStyle/>
-          <a:p>
-            <a:r>
-              <a:rPr lang="en-US" sz="1200" dirty="0" smtClean="0">
-                <a:latin typeface="Arial" charset="0"/>
-                <a:ea typeface="Arial" charset="0"/>
-                <a:cs typeface="Arial" charset="0"/>
-              </a:rPr>
-              <a:t>Asian</a:t>
-            </a:r>
-            <a:endParaRPr lang="en-US" sz="1200" dirty="0">
-              <a:latin typeface="Arial" charset="0"/>
-              <a:ea typeface="Arial" charset="0"/>
-              <a:cs typeface="Arial" charset="0"/>
-            </a:endParaRPr>
-          </a:p>
-        </p:txBody>
-      </p:sp>
-      <p:sp>
-        <p:nvSpPr>
-          <p:cNvPr id="64" name="TextBox 63"/>
-          <p:cNvSpPr txBox="1"/>
-          <p:nvPr/>
-        </p:nvSpPr>
-        <p:spPr>
-          <a:xfrm>
-            <a:off x="9413009" y="5976472"/>
-            <a:ext cx="771365" cy="276999"/>
-          </a:xfrm>
-          <a:prstGeom prst="rect">
-            <a:avLst/>
-          </a:prstGeom>
-          <a:noFill/>
-        </p:spPr>
-        <p:txBody>
-          <a:bodyPr wrap="none" rtlCol="0">
-            <a:spAutoFit/>
-          </a:bodyPr>
-          <a:lstStyle/>
-          <a:p>
-            <a:r>
-              <a:rPr lang="en-US" sz="1200" dirty="0" smtClean="0">
-                <a:latin typeface="Arial" charset="0"/>
-                <a:ea typeface="Arial" charset="0"/>
-                <a:cs typeface="Arial" charset="0"/>
-              </a:rPr>
-              <a:t>Hispanic</a:t>
-            </a:r>
-            <a:endParaRPr lang="en-US" sz="1200" dirty="0">
-              <a:latin typeface="Arial" charset="0"/>
-              <a:ea typeface="Arial" charset="0"/>
-              <a:cs typeface="Arial" charset="0"/>
-            </a:endParaRPr>
-          </a:p>
-        </p:txBody>
-      </p:sp>
-      <p:sp>
-        <p:nvSpPr>
-          <p:cNvPr id="65" name="Rectangle 64"/>
-          <p:cNvSpPr/>
-          <p:nvPr/>
-        </p:nvSpPr>
-        <p:spPr>
-          <a:xfrm>
-            <a:off x="7757980" y="636608"/>
-            <a:ext cx="2397950" cy="420324"/>
-          </a:xfrm>
-          <a:prstGeom prst="rect">
-            <a:avLst/>
-          </a:prstGeom>
-        </p:spPr>
-        <p:style>
-          <a:lnRef idx="2">
-            <a:schemeClr val="accent1">
-              <a:shade val="50000"/>
-            </a:schemeClr>
-          </a:lnRef>
-          <a:fillRef idx="1">
-            <a:schemeClr val="accent1"/>
-          </a:fillRef>
-          <a:effectRef idx="0">
-            <a:schemeClr val="accent1"/>
-          </a:effectRef>
-          <a:fontRef idx="minor">
-            <a:schemeClr val="lt1"/>
-          </a:fontRef>
-        </p:style>
-        <p:txBody>
-          <a:bodyPr rtlCol="0" anchor="ctr"/>
-          <a:lstStyle/>
-          <a:p>
-            <a:pPr algn="ctr"/>
             <a:r>
               <a:rPr lang="en-US" sz="1400" dirty="0" smtClean="0">
                 <a:latin typeface="Arial" charset="0"/>
                 <a:ea typeface="Arial" charset="0"/>
                 <a:cs typeface="Arial" charset="0"/>
               </a:rPr>
-              <a:t>Financial Aid (</a:t>
-            </a:r>
-            <a:r>
-              <a:rPr lang="en-US" sz="1400" dirty="0" smtClean="0">
-                <a:latin typeface="Arial" charset="0"/>
-                <a:ea typeface="Arial" charset="0"/>
-                <a:cs typeface="Arial" charset="0"/>
-              </a:rPr>
-              <a:t>annually</a:t>
-            </a:r>
-            <a:r>
-              <a:rPr lang="en-US" sz="1400" dirty="0" smtClean="0">
-                <a:latin typeface="Arial" charset="0"/>
-                <a:ea typeface="Arial" charset="0"/>
-                <a:cs typeface="Arial" charset="0"/>
-              </a:rPr>
-              <a:t>)</a:t>
+              <a:t>Financial Aid (annually)</a:t>
             </a:r>
             <a:endParaRPr lang="en-US" sz="1400" dirty="0">
               <a:latin typeface="Arial" charset="0"/>
@@ -5023,7 +4183,7 @@
         </p:nvCxnSpPr>
         <p:spPr>
           <a:xfrm>
-            <a:off x="7749828" y="1268557"/>
+            <a:off x="7917829" y="1254357"/>
             <a:ext cx="0" cy="1700302"/>
           </a:xfrm>
           <a:prstGeom prst="line">
@@ -5053,7 +4213,7 @@
         </p:nvCxnSpPr>
         <p:spPr>
           <a:xfrm>
-            <a:off x="7749828" y="2977788"/>
+            <a:off x="7917829" y="2963588"/>
             <a:ext cx="2397950" cy="0"/>
           </a:xfrm>
           <a:prstGeom prst="line">
@@ -5077,26 +4237,18 @@
       </p:cxnSp>
       <p:sp>
         <p:nvSpPr>
-          <p:cNvPr id="68" name="Rectangle 67"/>
+          <p:cNvPr id="76" name="Rectangle 75"/>
           <p:cNvSpPr/>
           <p:nvPr/>
         </p:nvSpPr>
         <p:spPr>
           <a:xfrm>
-            <a:off x="7958182" y="1612517"/>
-            <a:ext cx="360947" cy="1365271"/>
+            <a:off x="4527377" y="3601088"/>
+            <a:ext cx="2397950" cy="520288"/>
           </a:xfrm>
           <a:prstGeom prst="rect">
             <a:avLst/>
           </a:prstGeom>
-          <a:solidFill>
-            <a:schemeClr val="bg2">
-              <a:lumMod val="75000"/>
-            </a:schemeClr>
-          </a:solidFill>
-          <a:ln>
-            <a:noFill/>
-          </a:ln>
         </p:spPr>
         <p:style>
           <a:lnRef idx="2">
@@ -5119,355 +4271,13 @@
           <a:lstStyle/>
           <a:p>
             <a:pPr algn="ctr"/>
-            <a:endParaRPr lang="en-US"/>
-          </a:p>
-        </p:txBody>
-      </p:sp>
-      <p:sp>
-        <p:nvSpPr>
-          <p:cNvPr id="69" name="Rectangle 68"/>
-          <p:cNvSpPr/>
-          <p:nvPr/>
-        </p:nvSpPr>
-        <p:spPr>
-          <a:xfrm>
-            <a:off x="8489341" y="1392028"/>
-            <a:ext cx="360947" cy="1585758"/>
-          </a:xfrm>
-          <a:prstGeom prst="rect">
-            <a:avLst/>
-          </a:prstGeom>
-          <a:solidFill>
-            <a:schemeClr val="accent1"/>
-          </a:solidFill>
-          <a:ln>
-            <a:noFill/>
-          </a:ln>
-        </p:spPr>
-        <p:style>
-          <a:lnRef idx="2">
-            <a:schemeClr val="accent1">
-              <a:shade val="50000"/>
-            </a:schemeClr>
-          </a:lnRef>
-          <a:fillRef idx="1">
-            <a:schemeClr val="accent1"/>
-          </a:fillRef>
-          <a:effectRef idx="0">
-            <a:schemeClr val="accent1"/>
-          </a:effectRef>
-          <a:fontRef idx="minor">
-            <a:schemeClr val="lt1"/>
-          </a:fontRef>
-        </p:style>
-        <p:txBody>
-          <a:bodyPr rtlCol="0" anchor="ctr"/>
-          <a:lstStyle/>
-          <a:p>
-            <a:pPr algn="ctr"/>
-            <a:endParaRPr lang="en-US"/>
-          </a:p>
-        </p:txBody>
-      </p:sp>
-      <p:sp>
-        <p:nvSpPr>
-          <p:cNvPr id="70" name="Rectangle 69"/>
-          <p:cNvSpPr/>
-          <p:nvPr/>
-        </p:nvSpPr>
-        <p:spPr>
-          <a:xfrm>
-            <a:off x="9025986" y="2043953"/>
-            <a:ext cx="360947" cy="933832"/>
-          </a:xfrm>
-          <a:prstGeom prst="rect">
-            <a:avLst/>
-          </a:prstGeom>
-          <a:solidFill>
-            <a:schemeClr val="bg2">
-              <a:lumMod val="75000"/>
-            </a:schemeClr>
-          </a:solidFill>
-          <a:ln>
-            <a:noFill/>
-          </a:ln>
-        </p:spPr>
-        <p:style>
-          <a:lnRef idx="2">
-            <a:schemeClr val="accent1">
-              <a:shade val="50000"/>
-            </a:schemeClr>
-          </a:lnRef>
-          <a:fillRef idx="1">
-            <a:schemeClr val="accent1"/>
-          </a:fillRef>
-          <a:effectRef idx="0">
-            <a:schemeClr val="accent1"/>
-          </a:effectRef>
-          <a:fontRef idx="minor">
-            <a:schemeClr val="lt1"/>
-          </a:fontRef>
-        </p:style>
-        <p:txBody>
-          <a:bodyPr rtlCol="0" anchor="ctr"/>
-          <a:lstStyle/>
-          <a:p>
-            <a:pPr algn="ctr"/>
-            <a:endParaRPr lang="en-US"/>
-          </a:p>
-        </p:txBody>
-      </p:sp>
-      <p:sp>
-        <p:nvSpPr>
-          <p:cNvPr id="71" name="Rectangle 70"/>
-          <p:cNvSpPr/>
-          <p:nvPr/>
-        </p:nvSpPr>
-        <p:spPr>
-          <a:xfrm>
-            <a:off x="9583256" y="1844205"/>
-            <a:ext cx="360947" cy="1133579"/>
-          </a:xfrm>
-          <a:prstGeom prst="rect">
-            <a:avLst/>
-          </a:prstGeom>
-          <a:solidFill>
-            <a:schemeClr val="bg2">
-              <a:lumMod val="75000"/>
-            </a:schemeClr>
-          </a:solidFill>
-          <a:ln>
-            <a:noFill/>
-          </a:ln>
-        </p:spPr>
-        <p:style>
-          <a:lnRef idx="2">
-            <a:schemeClr val="accent1">
-              <a:shade val="50000"/>
-            </a:schemeClr>
-          </a:lnRef>
-          <a:fillRef idx="1">
-            <a:schemeClr val="accent1"/>
-          </a:fillRef>
-          <a:effectRef idx="0">
-            <a:schemeClr val="accent1"/>
-          </a:effectRef>
-          <a:fontRef idx="minor">
-            <a:schemeClr val="lt1"/>
-          </a:fontRef>
-        </p:style>
-        <p:txBody>
-          <a:bodyPr rtlCol="0" anchor="ctr"/>
-          <a:lstStyle/>
-          <a:p>
-            <a:pPr algn="ctr"/>
-            <a:endParaRPr lang="en-US"/>
-          </a:p>
-        </p:txBody>
-      </p:sp>
-      <p:sp>
-        <p:nvSpPr>
-          <p:cNvPr id="72" name="TextBox 71"/>
-          <p:cNvSpPr txBox="1"/>
-          <p:nvPr/>
-        </p:nvSpPr>
-        <p:spPr>
-          <a:xfrm>
-            <a:off x="7842550" y="3011992"/>
-            <a:ext cx="577402" cy="276999"/>
-          </a:xfrm>
-          <a:prstGeom prst="rect">
-            <a:avLst/>
-          </a:prstGeom>
-          <a:noFill/>
-        </p:spPr>
-        <p:txBody>
-          <a:bodyPr wrap="none" rtlCol="0">
-            <a:spAutoFit/>
-          </a:bodyPr>
-          <a:lstStyle/>
-          <a:p>
-            <a:r>
-              <a:rPr lang="en-US" sz="1200" dirty="0" smtClean="0">
-                <a:latin typeface="Arial" charset="0"/>
-                <a:ea typeface="Arial" charset="0"/>
-                <a:cs typeface="Arial" charset="0"/>
-              </a:rPr>
-              <a:t>White</a:t>
-            </a:r>
-            <a:endParaRPr lang="en-US" sz="1200" dirty="0">
-              <a:latin typeface="Arial" charset="0"/>
-              <a:ea typeface="Arial" charset="0"/>
-              <a:cs typeface="Arial" charset="0"/>
-            </a:endParaRPr>
-          </a:p>
-        </p:txBody>
-      </p:sp>
-      <p:sp>
-        <p:nvSpPr>
-          <p:cNvPr id="73" name="TextBox 72"/>
-          <p:cNvSpPr txBox="1"/>
-          <p:nvPr/>
-        </p:nvSpPr>
-        <p:spPr>
-          <a:xfrm>
-            <a:off x="8380892" y="3011992"/>
-            <a:ext cx="559769" cy="276999"/>
-          </a:xfrm>
-          <a:prstGeom prst="rect">
-            <a:avLst/>
-          </a:prstGeom>
-          <a:noFill/>
-        </p:spPr>
-        <p:txBody>
-          <a:bodyPr wrap="none" rtlCol="0">
-            <a:spAutoFit/>
-          </a:bodyPr>
-          <a:lstStyle/>
-          <a:p>
-            <a:r>
-              <a:rPr lang="en-US" sz="1200" dirty="0" smtClean="0">
-                <a:latin typeface="Arial" charset="0"/>
-                <a:ea typeface="Arial" charset="0"/>
-                <a:cs typeface="Arial" charset="0"/>
-              </a:rPr>
-              <a:t>Black</a:t>
-            </a:r>
-            <a:endParaRPr lang="en-US" sz="1200" dirty="0">
-              <a:latin typeface="Arial" charset="0"/>
-              <a:ea typeface="Arial" charset="0"/>
-              <a:cs typeface="Arial" charset="0"/>
-            </a:endParaRPr>
-          </a:p>
-        </p:txBody>
-      </p:sp>
-      <p:sp>
-        <p:nvSpPr>
-          <p:cNvPr id="74" name="TextBox 73"/>
-          <p:cNvSpPr txBox="1"/>
-          <p:nvPr/>
-        </p:nvSpPr>
-        <p:spPr>
-          <a:xfrm>
-            <a:off x="8904807" y="3011992"/>
-            <a:ext cx="567784" cy="276999"/>
-          </a:xfrm>
-          <a:prstGeom prst="rect">
-            <a:avLst/>
-          </a:prstGeom>
-          <a:noFill/>
-        </p:spPr>
-        <p:txBody>
-          <a:bodyPr wrap="none" rtlCol="0">
-            <a:spAutoFit/>
-          </a:bodyPr>
-          <a:lstStyle/>
-          <a:p>
-            <a:r>
-              <a:rPr lang="en-US" sz="1200" dirty="0" smtClean="0">
-                <a:latin typeface="Arial" charset="0"/>
-                <a:ea typeface="Arial" charset="0"/>
-                <a:cs typeface="Arial" charset="0"/>
-              </a:rPr>
-              <a:t>Asian</a:t>
-            </a:r>
-            <a:endParaRPr lang="en-US" sz="1200" dirty="0">
-              <a:latin typeface="Arial" charset="0"/>
-              <a:ea typeface="Arial" charset="0"/>
-              <a:cs typeface="Arial" charset="0"/>
-            </a:endParaRPr>
-          </a:p>
-        </p:txBody>
-      </p:sp>
-      <p:sp>
-        <p:nvSpPr>
-          <p:cNvPr id="75" name="TextBox 74"/>
-          <p:cNvSpPr txBox="1"/>
-          <p:nvPr/>
-        </p:nvSpPr>
-        <p:spPr>
-          <a:xfrm>
-            <a:off x="9436737" y="3011992"/>
-            <a:ext cx="771365" cy="276999"/>
-          </a:xfrm>
-          <a:prstGeom prst="rect">
-            <a:avLst/>
-          </a:prstGeom>
-          <a:noFill/>
-        </p:spPr>
-        <p:txBody>
-          <a:bodyPr wrap="none" rtlCol="0">
-            <a:spAutoFit/>
-          </a:bodyPr>
-          <a:lstStyle/>
-          <a:p>
-            <a:r>
-              <a:rPr lang="en-US" sz="1200" dirty="0" smtClean="0">
-                <a:latin typeface="Arial" charset="0"/>
-                <a:ea typeface="Arial" charset="0"/>
-                <a:cs typeface="Arial" charset="0"/>
-              </a:rPr>
-              <a:t>Hispanic</a:t>
-            </a:r>
-            <a:endParaRPr lang="en-US" sz="1200" dirty="0">
-              <a:latin typeface="Arial" charset="0"/>
-              <a:ea typeface="Arial" charset="0"/>
-              <a:cs typeface="Arial" charset="0"/>
-            </a:endParaRPr>
-          </a:p>
-        </p:txBody>
-      </p:sp>
-      <p:sp>
-        <p:nvSpPr>
-          <p:cNvPr id="76" name="Rectangle 75"/>
-          <p:cNvSpPr/>
-          <p:nvPr/>
-        </p:nvSpPr>
-        <p:spPr>
-          <a:xfrm>
-            <a:off x="4527377" y="3601088"/>
-            <a:ext cx="2397950" cy="520288"/>
-          </a:xfrm>
-          <a:prstGeom prst="rect">
-            <a:avLst/>
-          </a:prstGeom>
-        </p:spPr>
-        <p:style>
-          <a:lnRef idx="2">
-            <a:schemeClr val="accent1">
-              <a:shade val="50000"/>
-            </a:schemeClr>
-          </a:lnRef>
-          <a:fillRef idx="1">
-            <a:schemeClr val="accent1"/>
-          </a:fillRef>
-          <a:effectRef idx="0">
-            <a:schemeClr val="accent1"/>
-          </a:effectRef>
-          <a:fontRef idx="minor">
-            <a:schemeClr val="lt1"/>
-          </a:fontRef>
-        </p:style>
-        <p:txBody>
-          <a:bodyPr rtlCol="0" anchor="ctr"/>
-          <a:lstStyle/>
-          <a:p>
-            <a:pPr algn="ctr"/>
             <a:r>
               <a:rPr lang="en-US" sz="1400" dirty="0" smtClean="0">
                 <a:latin typeface="Arial" charset="0"/>
                 <a:ea typeface="Arial" charset="0"/>
                 <a:cs typeface="Arial" charset="0"/>
               </a:rPr>
-              <a:t>Average Family Income (</a:t>
-            </a:r>
-            <a:r>
-              <a:rPr lang="en-US" sz="1400" dirty="0" smtClean="0">
-                <a:latin typeface="Arial" charset="0"/>
-                <a:ea typeface="Arial" charset="0"/>
-                <a:cs typeface="Arial" charset="0"/>
-              </a:rPr>
-              <a:t>annually)</a:t>
+              <a:t>Average Family Income (annually)</a:t>
             </a:r>
             <a:endParaRPr lang="en-US" sz="1400" dirty="0">
               <a:latin typeface="Arial" charset="0"/>
@@ -5539,24 +4349,19 @@
       </p:cxnSp>
       <p:sp>
         <p:nvSpPr>
-          <p:cNvPr id="79" name="Rectangle 78"/>
+          <p:cNvPr id="87" name="Rectangle 86"/>
           <p:cNvSpPr/>
           <p:nvPr/>
         </p:nvSpPr>
         <p:spPr>
           <a:xfrm>
-            <a:off x="4727579" y="4356509"/>
-            <a:ext cx="360947" cy="1585759"/>
+            <a:off x="564077" y="81023"/>
+            <a:ext cx="3103833" cy="6690168"/>
           </a:xfrm>
           <a:prstGeom prst="rect">
             <a:avLst/>
           </a:prstGeom>
-          <a:solidFill>
-            <a:schemeClr val="accent1"/>
-          </a:solidFill>
-          <a:ln>
-            <a:noFill/>
-          </a:ln>
+          <a:noFill/>
         </p:spPr>
         <p:style>
           <a:lnRef idx="2">
@@ -5583,343 +4388,6 @@
           </a:p>
         </p:txBody>
       </p:sp>
-      <p:sp>
-        <p:nvSpPr>
-          <p:cNvPr id="80" name="Rectangle 79"/>
-          <p:cNvSpPr/>
-          <p:nvPr/>
-        </p:nvSpPr>
-        <p:spPr>
-          <a:xfrm>
-            <a:off x="5258738" y="4808684"/>
-            <a:ext cx="360947" cy="1133582"/>
-          </a:xfrm>
-          <a:prstGeom prst="rect">
-            <a:avLst/>
-          </a:prstGeom>
-          <a:solidFill>
-            <a:schemeClr val="bg2">
-              <a:lumMod val="75000"/>
-            </a:schemeClr>
-          </a:solidFill>
-          <a:ln>
-            <a:noFill/>
-          </a:ln>
-        </p:spPr>
-        <p:style>
-          <a:lnRef idx="2">
-            <a:schemeClr val="accent1">
-              <a:shade val="50000"/>
-            </a:schemeClr>
-          </a:lnRef>
-          <a:fillRef idx="1">
-            <a:schemeClr val="accent1"/>
-          </a:fillRef>
-          <a:effectRef idx="0">
-            <a:schemeClr val="accent1"/>
-          </a:effectRef>
-          <a:fontRef idx="minor">
-            <a:schemeClr val="lt1"/>
-          </a:fontRef>
-        </p:style>
-        <p:txBody>
-          <a:bodyPr rtlCol="0" anchor="ctr"/>
-          <a:lstStyle/>
-          <a:p>
-            <a:pPr algn="ctr"/>
-            <a:endParaRPr lang="en-US"/>
-          </a:p>
-        </p:txBody>
-      </p:sp>
-      <p:sp>
-        <p:nvSpPr>
-          <p:cNvPr id="81" name="Rectangle 80"/>
-          <p:cNvSpPr/>
-          <p:nvPr/>
-        </p:nvSpPr>
-        <p:spPr>
-          <a:xfrm>
-            <a:off x="5795383" y="4643849"/>
-            <a:ext cx="360947" cy="1298416"/>
-          </a:xfrm>
-          <a:prstGeom prst="rect">
-            <a:avLst/>
-          </a:prstGeom>
-          <a:solidFill>
-            <a:schemeClr val="bg2">
-              <a:lumMod val="75000"/>
-            </a:schemeClr>
-          </a:solidFill>
-          <a:ln>
-            <a:noFill/>
-          </a:ln>
-        </p:spPr>
-        <p:style>
-          <a:lnRef idx="2">
-            <a:schemeClr val="accent1">
-              <a:shade val="50000"/>
-            </a:schemeClr>
-          </a:lnRef>
-          <a:fillRef idx="1">
-            <a:schemeClr val="accent1"/>
-          </a:fillRef>
-          <a:effectRef idx="0">
-            <a:schemeClr val="accent1"/>
-          </a:effectRef>
-          <a:fontRef idx="minor">
-            <a:schemeClr val="lt1"/>
-          </a:fontRef>
-        </p:style>
-        <p:txBody>
-          <a:bodyPr rtlCol="0" anchor="ctr"/>
-          <a:lstStyle/>
-          <a:p>
-            <a:pPr algn="ctr"/>
-            <a:endParaRPr lang="en-US"/>
-          </a:p>
-        </p:txBody>
-      </p:sp>
-      <p:sp>
-        <p:nvSpPr>
-          <p:cNvPr id="82" name="Rectangle 81"/>
-          <p:cNvSpPr/>
-          <p:nvPr/>
-        </p:nvSpPr>
-        <p:spPr>
-          <a:xfrm>
-            <a:off x="6352653" y="4808685"/>
-            <a:ext cx="360947" cy="1133579"/>
-          </a:xfrm>
-          <a:prstGeom prst="rect">
-            <a:avLst/>
-          </a:prstGeom>
-          <a:solidFill>
-            <a:schemeClr val="bg2">
-              <a:lumMod val="75000"/>
-            </a:schemeClr>
-          </a:solidFill>
-          <a:ln>
-            <a:noFill/>
-          </a:ln>
-        </p:spPr>
-        <p:style>
-          <a:lnRef idx="2">
-            <a:schemeClr val="accent1">
-              <a:shade val="50000"/>
-            </a:schemeClr>
-          </a:lnRef>
-          <a:fillRef idx="1">
-            <a:schemeClr val="accent1"/>
-          </a:fillRef>
-          <a:effectRef idx="0">
-            <a:schemeClr val="accent1"/>
-          </a:effectRef>
-          <a:fontRef idx="minor">
-            <a:schemeClr val="lt1"/>
-          </a:fontRef>
-        </p:style>
-        <p:txBody>
-          <a:bodyPr rtlCol="0" anchor="ctr"/>
-          <a:lstStyle/>
-          <a:p>
-            <a:pPr algn="ctr"/>
-            <a:endParaRPr lang="en-US"/>
-          </a:p>
-        </p:txBody>
-      </p:sp>
-      <p:sp>
-        <p:nvSpPr>
-          <p:cNvPr id="83" name="TextBox 82"/>
-          <p:cNvSpPr txBox="1"/>
-          <p:nvPr/>
-        </p:nvSpPr>
-        <p:spPr>
-          <a:xfrm>
-            <a:off x="4611947" y="5976472"/>
-            <a:ext cx="577402" cy="276999"/>
-          </a:xfrm>
-          <a:prstGeom prst="rect">
-            <a:avLst/>
-          </a:prstGeom>
-          <a:noFill/>
-        </p:spPr>
-        <p:txBody>
-          <a:bodyPr wrap="none" rtlCol="0">
-            <a:spAutoFit/>
-          </a:bodyPr>
-          <a:lstStyle/>
-          <a:p>
-            <a:r>
-              <a:rPr lang="en-US" sz="1200" dirty="0" smtClean="0">
-                <a:latin typeface="Arial" charset="0"/>
-                <a:ea typeface="Arial" charset="0"/>
-                <a:cs typeface="Arial" charset="0"/>
-              </a:rPr>
-              <a:t>White</a:t>
-            </a:r>
-            <a:endParaRPr lang="en-US" sz="1200" dirty="0">
-              <a:latin typeface="Arial" charset="0"/>
-              <a:ea typeface="Arial" charset="0"/>
-              <a:cs typeface="Arial" charset="0"/>
-            </a:endParaRPr>
-          </a:p>
-        </p:txBody>
-      </p:sp>
-      <p:sp>
-        <p:nvSpPr>
-          <p:cNvPr id="84" name="TextBox 83"/>
-          <p:cNvSpPr txBox="1"/>
-          <p:nvPr/>
-        </p:nvSpPr>
-        <p:spPr>
-          <a:xfrm>
-            <a:off x="5150289" y="5976472"/>
-            <a:ext cx="559769" cy="276999"/>
-          </a:xfrm>
-          <a:prstGeom prst="rect">
-            <a:avLst/>
-          </a:prstGeom>
-          <a:noFill/>
-        </p:spPr>
-        <p:txBody>
-          <a:bodyPr wrap="none" rtlCol="0">
-            <a:spAutoFit/>
-          </a:bodyPr>
-          <a:lstStyle/>
-          <a:p>
-            <a:r>
-              <a:rPr lang="en-US" sz="1200" dirty="0" smtClean="0">
-                <a:latin typeface="Arial" charset="0"/>
-                <a:ea typeface="Arial" charset="0"/>
-                <a:cs typeface="Arial" charset="0"/>
-              </a:rPr>
-              <a:t>Black</a:t>
-            </a:r>
-            <a:endParaRPr lang="en-US" sz="1200" dirty="0">
-              <a:latin typeface="Arial" charset="0"/>
-              <a:ea typeface="Arial" charset="0"/>
-              <a:cs typeface="Arial" charset="0"/>
-            </a:endParaRPr>
-          </a:p>
-        </p:txBody>
-      </p:sp>
-      <p:sp>
-        <p:nvSpPr>
-          <p:cNvPr id="85" name="TextBox 84"/>
-          <p:cNvSpPr txBox="1"/>
-          <p:nvPr/>
-        </p:nvSpPr>
-        <p:spPr>
-          <a:xfrm>
-            <a:off x="5674204" y="5976472"/>
-            <a:ext cx="567784" cy="276999"/>
-          </a:xfrm>
-          <a:prstGeom prst="rect">
-            <a:avLst/>
-          </a:prstGeom>
-          <a:noFill/>
-        </p:spPr>
-        <p:txBody>
-          <a:bodyPr wrap="none" rtlCol="0">
-            <a:spAutoFit/>
-          </a:bodyPr>
-          <a:lstStyle/>
-          <a:p>
-            <a:r>
-              <a:rPr lang="en-US" sz="1200" dirty="0" smtClean="0">
-                <a:latin typeface="Arial" charset="0"/>
-                <a:ea typeface="Arial" charset="0"/>
-                <a:cs typeface="Arial" charset="0"/>
-              </a:rPr>
-              <a:t>Asian</a:t>
-            </a:r>
-            <a:endParaRPr lang="en-US" sz="1200" dirty="0">
-              <a:latin typeface="Arial" charset="0"/>
-              <a:ea typeface="Arial" charset="0"/>
-              <a:cs typeface="Arial" charset="0"/>
-            </a:endParaRPr>
-          </a:p>
-        </p:txBody>
-      </p:sp>
-      <p:sp>
-        <p:nvSpPr>
-          <p:cNvPr id="86" name="TextBox 85"/>
-          <p:cNvSpPr txBox="1"/>
-          <p:nvPr/>
-        </p:nvSpPr>
-        <p:spPr>
-          <a:xfrm>
-            <a:off x="6206134" y="5976472"/>
-            <a:ext cx="771365" cy="276999"/>
-          </a:xfrm>
-          <a:prstGeom prst="rect">
-            <a:avLst/>
-          </a:prstGeom>
-          <a:noFill/>
-        </p:spPr>
-        <p:txBody>
-          <a:bodyPr wrap="none" rtlCol="0">
-            <a:spAutoFit/>
-          </a:bodyPr>
-          <a:lstStyle/>
-          <a:p>
-            <a:r>
-              <a:rPr lang="en-US" sz="1200" dirty="0" smtClean="0">
-                <a:latin typeface="Arial" charset="0"/>
-                <a:ea typeface="Arial" charset="0"/>
-                <a:cs typeface="Arial" charset="0"/>
-              </a:rPr>
-              <a:t>Hispanic</a:t>
-            </a:r>
-            <a:endParaRPr lang="en-US" sz="1200" dirty="0">
-              <a:latin typeface="Arial" charset="0"/>
-              <a:ea typeface="Arial" charset="0"/>
-              <a:cs typeface="Arial" charset="0"/>
-            </a:endParaRPr>
-          </a:p>
-        </p:txBody>
-      </p:sp>
-      <p:sp>
-        <p:nvSpPr>
-          <p:cNvPr id="87" name="Rectangle 86"/>
-          <p:cNvSpPr/>
-          <p:nvPr/>
-        </p:nvSpPr>
-        <p:spPr>
-          <a:xfrm>
-            <a:off x="564077" y="81023"/>
-            <a:ext cx="3103833" cy="6690168"/>
-          </a:xfrm>
-          <a:prstGeom prst="rect">
-            <a:avLst/>
-          </a:prstGeom>
-          <a:noFill/>
-        </p:spPr>
-        <p:style>
-          <a:lnRef idx="2">
-            <a:schemeClr val="accent1">
-              <a:shade val="50000"/>
-            </a:schemeClr>
-          </a:lnRef>
-          <a:fillRef idx="1">
-            <a:schemeClr val="accent1"/>
-          </a:fillRef>
-          <a:effectRef idx="0">
-            <a:schemeClr val="accent1"/>
-          </a:effectRef>
-          <a:fontRef idx="minor">
-            <a:schemeClr val="lt1"/>
-          </a:fontRef>
-        </p:style>
-        <p:txBody>
-          <a:bodyPr rtlCol="0" anchor="ctr"/>
-          <a:lstStyle/>
-          <a:p>
-            <a:pPr algn="ctr"/>
-            <a:endParaRPr lang="en-US"/>
-          </a:p>
-        </p:txBody>
-      </p:sp>
       <p:cxnSp>
         <p:nvCxnSpPr>
           <p:cNvPr id="100" name="Straight Connector 99"/>
@@ -5928,7 +4396,7 @@
         </p:nvCxnSpPr>
         <p:spPr>
           <a:xfrm>
-            <a:off x="10178772" y="5059742"/>
+            <a:off x="6879101" y="2517910"/>
             <a:ext cx="258090" cy="90469"/>
           </a:xfrm>
           <a:prstGeom prst="line">
@@ -5963,7 +4431,7 @@
         </p:nvSpPr>
         <p:spPr>
           <a:xfrm>
-            <a:off x="9756806" y="4393276"/>
+            <a:off x="6457135" y="1851444"/>
             <a:ext cx="938277" cy="380789"/>
           </a:xfrm>
           <a:prstGeom prst="wedgeRectCallout">
@@ -6023,7 +4491,7 @@
         </p:nvSpPr>
         <p:spPr>
           <a:xfrm>
-            <a:off x="9648926" y="4772846"/>
+            <a:off x="6317468" y="2239717"/>
             <a:ext cx="229037" cy="242681"/>
           </a:xfrm>
           <a:prstGeom prst="donut">
@@ -6070,7 +4538,7 @@
         </p:nvSpPr>
         <p:spPr>
           <a:xfrm rot="17362189">
-            <a:off x="9801325" y="4690326"/>
+            <a:off x="6501654" y="2148494"/>
             <a:ext cx="415929" cy="560370"/>
           </a:xfrm>
           <a:prstGeom prst="triangle">
@@ -6151,8 +4619,8 @@
         </p:nvSpPr>
         <p:spPr>
           <a:xfrm rot="16200000">
-            <a:off x="6601396" y="1894836"/>
-            <a:ext cx="1895071" cy="276999"/>
+            <a:off x="7259668" y="1906433"/>
+            <a:ext cx="909223" cy="276999"/>
           </a:xfrm>
           <a:prstGeom prst="rect">
             <a:avLst/>
@@ -6171,7 +4639,7 @@
                 <a:ea typeface="Arial" charset="0"/>
                 <a:cs typeface="Arial" charset="0"/>
               </a:rPr>
-              <a:t>Average Financial Aid ($)</a:t>
+              <a:t>Frequency</a:t>
             </a:r>
             <a:endParaRPr lang="en-US" sz="1200" dirty="0">
               <a:latin typeface="Arial" charset="0"/>
@@ -6189,8 +4657,8 @@
         </p:nvSpPr>
         <p:spPr>
           <a:xfrm rot="16200000">
-            <a:off x="3569704" y="4959961"/>
-            <a:ext cx="1530034" cy="276999"/>
+            <a:off x="3880111" y="4959961"/>
+            <a:ext cx="909223" cy="276999"/>
           </a:xfrm>
           <a:prstGeom prst="rect">
             <a:avLst/>
@@ -6209,7 +4677,7 @@
                 <a:ea typeface="Arial" charset="0"/>
                 <a:cs typeface="Arial" charset="0"/>
               </a:rPr>
-              <a:t>Average Income ($)</a:t>
+              <a:t>Frequency</a:t>
             </a:r>
             <a:endParaRPr lang="en-US" sz="1200" dirty="0">
               <a:latin typeface="Arial" charset="0"/>
@@ -6227,8 +4695,8 @@
         </p:nvSpPr>
         <p:spPr>
           <a:xfrm rot="16200000">
-            <a:off x="6753418" y="4805362"/>
-            <a:ext cx="1530034" cy="276999"/>
+            <a:off x="7258127" y="4816896"/>
+            <a:ext cx="909223" cy="276999"/>
           </a:xfrm>
           <a:prstGeom prst="rect">
             <a:avLst/>
@@ -6247,13 +4715,1273 @@
                 <a:ea typeface="Arial" charset="0"/>
                 <a:cs typeface="Arial" charset="0"/>
               </a:rPr>
-              <a:t>Average Income ($)</a:t>
+              <a:t>Frequency</a:t>
             </a:r>
             <a:endParaRPr lang="en-US" sz="1200" dirty="0">
               <a:latin typeface="Arial" charset="0"/>
               <a:ea typeface="Arial" charset="0"/>
               <a:cs typeface="Arial" charset="0"/>
             </a:endParaRPr>
+          </a:p>
+        </p:txBody>
+      </p:sp>
+      <p:sp>
+        <p:nvSpPr>
+          <p:cNvPr id="3" name="Rectangle 2"/>
+          <p:cNvSpPr/>
+          <p:nvPr/>
+        </p:nvSpPr>
+        <p:spPr>
+          <a:xfrm>
+            <a:off x="767332" y="3243289"/>
+            <a:ext cx="2198294" cy="369332"/>
+          </a:xfrm>
+          <a:prstGeom prst="rect">
+            <a:avLst/>
+          </a:prstGeom>
+        </p:spPr>
+        <p:txBody>
+          <a:bodyPr wrap="none">
+            <a:spAutoFit/>
+          </a:bodyPr>
+          <a:lstStyle/>
+          <a:p>
+            <a:r>
+              <a:rPr lang="en-US" dirty="0" smtClean="0">
+                <a:latin typeface="Arial" charset="0"/>
+                <a:ea typeface="Arial" charset="0"/>
+                <a:cs typeface="Arial" charset="0"/>
+              </a:rPr>
+              <a:t>Average SAT Score</a:t>
+            </a:r>
+            <a:endParaRPr lang="en-US" dirty="0">
+              <a:latin typeface="Arial" charset="0"/>
+              <a:ea typeface="Arial" charset="0"/>
+              <a:cs typeface="Arial" charset="0"/>
+            </a:endParaRPr>
+          </a:p>
+        </p:txBody>
+      </p:sp>
+      <p:sp>
+        <p:nvSpPr>
+          <p:cNvPr id="94" name="Rounded Rectangle 93"/>
+          <p:cNvSpPr/>
+          <p:nvPr/>
+        </p:nvSpPr>
+        <p:spPr>
+          <a:xfrm flipH="1">
+            <a:off x="767332" y="3745559"/>
+            <a:ext cx="2632541" cy="72000"/>
+          </a:xfrm>
+          <a:prstGeom prst="roundRect">
+            <a:avLst/>
+          </a:prstGeom>
+          <a:solidFill>
+            <a:schemeClr val="bg1"/>
+          </a:solidFill>
+        </p:spPr>
+        <p:style>
+          <a:lnRef idx="2">
+            <a:schemeClr val="accent1">
+              <a:shade val="50000"/>
+            </a:schemeClr>
+          </a:lnRef>
+          <a:fillRef idx="1">
+            <a:schemeClr val="accent1"/>
+          </a:fillRef>
+          <a:effectRef idx="0">
+            <a:schemeClr val="accent1"/>
+          </a:effectRef>
+          <a:fontRef idx="minor">
+            <a:schemeClr val="lt1"/>
+          </a:fontRef>
+        </p:style>
+        <p:txBody>
+          <a:bodyPr rtlCol="0" anchor="ctr"/>
+          <a:lstStyle/>
+          <a:p>
+            <a:pPr algn="ctr"/>
+            <a:endParaRPr lang="en-US"/>
+          </a:p>
+        </p:txBody>
+      </p:sp>
+      <p:sp>
+        <p:nvSpPr>
+          <p:cNvPr id="6" name="Oval 5"/>
+          <p:cNvSpPr/>
+          <p:nvPr/>
+        </p:nvSpPr>
+        <p:spPr>
+          <a:xfrm>
+            <a:off x="1121879" y="3655231"/>
+            <a:ext cx="216000" cy="216000"/>
+          </a:xfrm>
+          <a:prstGeom prst="ellipse">
+            <a:avLst/>
+          </a:prstGeom>
+        </p:spPr>
+        <p:style>
+          <a:lnRef idx="2">
+            <a:schemeClr val="accent1">
+              <a:shade val="50000"/>
+            </a:schemeClr>
+          </a:lnRef>
+          <a:fillRef idx="1">
+            <a:schemeClr val="accent1"/>
+          </a:fillRef>
+          <a:effectRef idx="0">
+            <a:schemeClr val="accent1"/>
+          </a:effectRef>
+          <a:fontRef idx="minor">
+            <a:schemeClr val="lt1"/>
+          </a:fontRef>
+        </p:style>
+        <p:txBody>
+          <a:bodyPr rtlCol="0" anchor="ctr"/>
+          <a:lstStyle/>
+          <a:p>
+            <a:pPr algn="ctr"/>
+            <a:endParaRPr lang="en-US"/>
+          </a:p>
+        </p:txBody>
+      </p:sp>
+      <p:sp>
+        <p:nvSpPr>
+          <p:cNvPr id="96" name="Oval 95"/>
+          <p:cNvSpPr/>
+          <p:nvPr/>
+        </p:nvSpPr>
+        <p:spPr>
+          <a:xfrm>
+            <a:off x="2885703" y="3655231"/>
+            <a:ext cx="216000" cy="216000"/>
+          </a:xfrm>
+          <a:prstGeom prst="ellipse">
+            <a:avLst/>
+          </a:prstGeom>
+        </p:spPr>
+        <p:style>
+          <a:lnRef idx="2">
+            <a:schemeClr val="accent1">
+              <a:shade val="50000"/>
+            </a:schemeClr>
+          </a:lnRef>
+          <a:fillRef idx="1">
+            <a:schemeClr val="accent1"/>
+          </a:fillRef>
+          <a:effectRef idx="0">
+            <a:schemeClr val="accent1"/>
+          </a:effectRef>
+          <a:fontRef idx="minor">
+            <a:schemeClr val="lt1"/>
+          </a:fontRef>
+        </p:style>
+        <p:txBody>
+          <a:bodyPr rtlCol="0" anchor="ctr"/>
+          <a:lstStyle/>
+          <a:p>
+            <a:pPr algn="ctr"/>
+            <a:endParaRPr lang="en-US"/>
+          </a:p>
+        </p:txBody>
+      </p:sp>
+      <p:sp>
+        <p:nvSpPr>
+          <p:cNvPr id="97" name="TextBox 96"/>
+          <p:cNvSpPr txBox="1"/>
+          <p:nvPr/>
+        </p:nvSpPr>
+        <p:spPr>
+          <a:xfrm>
+            <a:off x="723302" y="3918824"/>
+            <a:ext cx="439544" cy="276999"/>
+          </a:xfrm>
+          <a:prstGeom prst="rect">
+            <a:avLst/>
+          </a:prstGeom>
+          <a:noFill/>
+        </p:spPr>
+        <p:txBody>
+          <a:bodyPr wrap="none" rtlCol="0">
+            <a:spAutoFit/>
+          </a:bodyPr>
+          <a:lstStyle/>
+          <a:p>
+            <a:r>
+              <a:rPr lang="en-US" sz="1200" dirty="0" smtClean="0">
+                <a:latin typeface="Arial" charset="0"/>
+                <a:ea typeface="Arial" charset="0"/>
+                <a:cs typeface="Arial" charset="0"/>
+              </a:rPr>
+              <a:t>700</a:t>
+            </a:r>
+            <a:endParaRPr lang="en-US" sz="1200" dirty="0">
+              <a:latin typeface="Arial" charset="0"/>
+              <a:ea typeface="Arial" charset="0"/>
+              <a:cs typeface="Arial" charset="0"/>
+            </a:endParaRPr>
+          </a:p>
+        </p:txBody>
+      </p:sp>
+      <p:sp>
+        <p:nvSpPr>
+          <p:cNvPr id="99" name="TextBox 98"/>
+          <p:cNvSpPr txBox="1"/>
+          <p:nvPr/>
+        </p:nvSpPr>
+        <p:spPr>
+          <a:xfrm>
+            <a:off x="2993803" y="3901845"/>
+            <a:ext cx="524503" cy="276999"/>
+          </a:xfrm>
+          <a:prstGeom prst="rect">
+            <a:avLst/>
+          </a:prstGeom>
+          <a:noFill/>
+        </p:spPr>
+        <p:txBody>
+          <a:bodyPr wrap="none" rtlCol="0">
+            <a:spAutoFit/>
+          </a:bodyPr>
+          <a:lstStyle/>
+          <a:p>
+            <a:r>
+              <a:rPr lang="en-US" sz="1200" dirty="0" smtClean="0">
+                <a:latin typeface="Arial" charset="0"/>
+                <a:ea typeface="Arial" charset="0"/>
+                <a:cs typeface="Arial" charset="0"/>
+              </a:rPr>
+              <a:t>1700</a:t>
+            </a:r>
+            <a:endParaRPr lang="en-US" sz="1200" dirty="0">
+              <a:latin typeface="Arial" charset="0"/>
+              <a:ea typeface="Arial" charset="0"/>
+              <a:cs typeface="Arial" charset="0"/>
+            </a:endParaRPr>
+          </a:p>
+        </p:txBody>
+      </p:sp>
+      <p:sp>
+        <p:nvSpPr>
+          <p:cNvPr id="103" name="TextBox 102"/>
+          <p:cNvSpPr txBox="1"/>
+          <p:nvPr/>
+        </p:nvSpPr>
+        <p:spPr>
+          <a:xfrm>
+            <a:off x="2319298" y="3901845"/>
+            <a:ext cx="524503" cy="276999"/>
+          </a:xfrm>
+          <a:prstGeom prst="rect">
+            <a:avLst/>
+          </a:prstGeom>
+          <a:noFill/>
+        </p:spPr>
+        <p:txBody>
+          <a:bodyPr wrap="none" rtlCol="0">
+            <a:spAutoFit/>
+          </a:bodyPr>
+          <a:lstStyle/>
+          <a:p>
+            <a:r>
+              <a:rPr lang="en-US" sz="1200" dirty="0" smtClean="0">
+                <a:latin typeface="Arial" charset="0"/>
+                <a:ea typeface="Arial" charset="0"/>
+                <a:cs typeface="Arial" charset="0"/>
+              </a:rPr>
+              <a:t>1200</a:t>
+            </a:r>
+            <a:endParaRPr lang="en-US" sz="1200" dirty="0">
+              <a:latin typeface="Arial" charset="0"/>
+              <a:ea typeface="Arial" charset="0"/>
+              <a:cs typeface="Arial" charset="0"/>
+            </a:endParaRPr>
+          </a:p>
+        </p:txBody>
+      </p:sp>
+      <p:sp>
+        <p:nvSpPr>
+          <p:cNvPr id="109" name="TextBox 108"/>
+          <p:cNvSpPr txBox="1"/>
+          <p:nvPr/>
+        </p:nvSpPr>
+        <p:spPr>
+          <a:xfrm>
+            <a:off x="1614014" y="3901845"/>
+            <a:ext cx="524503" cy="276999"/>
+          </a:xfrm>
+          <a:prstGeom prst="rect">
+            <a:avLst/>
+          </a:prstGeom>
+          <a:noFill/>
+        </p:spPr>
+        <p:txBody>
+          <a:bodyPr wrap="none" rtlCol="0">
+            <a:spAutoFit/>
+          </a:bodyPr>
+          <a:lstStyle/>
+          <a:p>
+            <a:r>
+              <a:rPr lang="en-US" sz="1200" dirty="0" smtClean="0">
+                <a:latin typeface="Arial" charset="0"/>
+                <a:ea typeface="Arial" charset="0"/>
+                <a:cs typeface="Arial" charset="0"/>
+              </a:rPr>
+              <a:t>1000</a:t>
+            </a:r>
+            <a:endParaRPr lang="en-US" sz="1200" dirty="0">
+              <a:latin typeface="Arial" charset="0"/>
+              <a:ea typeface="Arial" charset="0"/>
+              <a:cs typeface="Arial" charset="0"/>
+            </a:endParaRPr>
+          </a:p>
+        </p:txBody>
+      </p:sp>
+      <p:sp>
+        <p:nvSpPr>
+          <p:cNvPr id="33" name="Freeform 32"/>
+          <p:cNvSpPr/>
+          <p:nvPr/>
+        </p:nvSpPr>
+        <p:spPr>
+          <a:xfrm>
+            <a:off x="4701819" y="4675764"/>
+            <a:ext cx="1734665" cy="1250355"/>
+          </a:xfrm>
+          <a:custGeom>
+            <a:avLst/>
+            <a:gdLst>
+              <a:gd name="connsiteX0" fmla="*/ 0 w 1215342"/>
+              <a:gd name="connsiteY0" fmla="*/ 1250355 h 1250355"/>
+              <a:gd name="connsiteX1" fmla="*/ 358815 w 1215342"/>
+              <a:gd name="connsiteY1" fmla="*/ 798942 h 1250355"/>
+              <a:gd name="connsiteX2" fmla="*/ 648182 w 1215342"/>
+              <a:gd name="connsiteY2" fmla="*/ 289 h 1250355"/>
+              <a:gd name="connsiteX3" fmla="*/ 937549 w 1215342"/>
+              <a:gd name="connsiteY3" fmla="*/ 891539 h 1250355"/>
+              <a:gd name="connsiteX4" fmla="*/ 1215342 w 1215342"/>
+              <a:gd name="connsiteY4" fmla="*/ 1250355 h 1250355"/>
+            </a:gdLst>
+            <a:ahLst/>
+            <a:cxnLst>
+              <a:cxn ang="0">
+                <a:pos x="connsiteX0" y="connsiteY0"/>
+              </a:cxn>
+              <a:cxn ang="0">
+                <a:pos x="connsiteX1" y="connsiteY1"/>
+              </a:cxn>
+              <a:cxn ang="0">
+                <a:pos x="connsiteX2" y="connsiteY2"/>
+              </a:cxn>
+              <a:cxn ang="0">
+                <a:pos x="connsiteX3" y="connsiteY3"/>
+              </a:cxn>
+              <a:cxn ang="0">
+                <a:pos x="connsiteX4" y="connsiteY4"/>
+              </a:cxn>
+            </a:cxnLst>
+            <a:rect l="l" t="t" r="r" b="b"/>
+            <a:pathLst>
+              <a:path w="1215342" h="1250355">
+                <a:moveTo>
+                  <a:pt x="0" y="1250355"/>
+                </a:moveTo>
+                <a:cubicBezTo>
+                  <a:pt x="125392" y="1128820"/>
+                  <a:pt x="250785" y="1007286"/>
+                  <a:pt x="358815" y="798942"/>
+                </a:cubicBezTo>
+                <a:cubicBezTo>
+                  <a:pt x="466845" y="590598"/>
+                  <a:pt x="551726" y="-15144"/>
+                  <a:pt x="648182" y="289"/>
+                </a:cubicBezTo>
+                <a:cubicBezTo>
+                  <a:pt x="744638" y="15722"/>
+                  <a:pt x="843022" y="683195"/>
+                  <a:pt x="937549" y="891539"/>
+                </a:cubicBezTo>
+                <a:cubicBezTo>
+                  <a:pt x="1032076" y="1099883"/>
+                  <a:pt x="1174831" y="1190552"/>
+                  <a:pt x="1215342" y="1250355"/>
+                </a:cubicBezTo>
+              </a:path>
+            </a:pathLst>
+          </a:custGeom>
+          <a:noFill/>
+          <a:ln w="38100">
+            <a:solidFill>
+              <a:srgbClr val="7030A0"/>
+            </a:solidFill>
+          </a:ln>
+        </p:spPr>
+        <p:style>
+          <a:lnRef idx="2">
+            <a:schemeClr val="accent1">
+              <a:shade val="50000"/>
+            </a:schemeClr>
+          </a:lnRef>
+          <a:fillRef idx="1">
+            <a:schemeClr val="accent1"/>
+          </a:fillRef>
+          <a:effectRef idx="0">
+            <a:schemeClr val="accent1"/>
+          </a:effectRef>
+          <a:fontRef idx="minor">
+            <a:schemeClr val="lt1"/>
+          </a:fontRef>
+        </p:style>
+        <p:txBody>
+          <a:bodyPr rtlCol="0" anchor="ctr"/>
+          <a:lstStyle/>
+          <a:p>
+            <a:pPr algn="ctr"/>
+            <a:endParaRPr lang="en-US"/>
+          </a:p>
+        </p:txBody>
+      </p:sp>
+      <p:sp>
+        <p:nvSpPr>
+          <p:cNvPr id="114" name="Freeform 113"/>
+          <p:cNvSpPr/>
+          <p:nvPr/>
+        </p:nvSpPr>
+        <p:spPr>
+          <a:xfrm>
+            <a:off x="4565724" y="4786981"/>
+            <a:ext cx="1440241" cy="1155127"/>
+          </a:xfrm>
+          <a:custGeom>
+            <a:avLst/>
+            <a:gdLst>
+              <a:gd name="connsiteX0" fmla="*/ 0 w 1215342"/>
+              <a:gd name="connsiteY0" fmla="*/ 1250355 h 1250355"/>
+              <a:gd name="connsiteX1" fmla="*/ 358815 w 1215342"/>
+              <a:gd name="connsiteY1" fmla="*/ 798942 h 1250355"/>
+              <a:gd name="connsiteX2" fmla="*/ 648182 w 1215342"/>
+              <a:gd name="connsiteY2" fmla="*/ 289 h 1250355"/>
+              <a:gd name="connsiteX3" fmla="*/ 937549 w 1215342"/>
+              <a:gd name="connsiteY3" fmla="*/ 891539 h 1250355"/>
+              <a:gd name="connsiteX4" fmla="*/ 1215342 w 1215342"/>
+              <a:gd name="connsiteY4" fmla="*/ 1250355 h 1250355"/>
+            </a:gdLst>
+            <a:ahLst/>
+            <a:cxnLst>
+              <a:cxn ang="0">
+                <a:pos x="connsiteX0" y="connsiteY0"/>
+              </a:cxn>
+              <a:cxn ang="0">
+                <a:pos x="connsiteX1" y="connsiteY1"/>
+              </a:cxn>
+              <a:cxn ang="0">
+                <a:pos x="connsiteX2" y="connsiteY2"/>
+              </a:cxn>
+              <a:cxn ang="0">
+                <a:pos x="connsiteX3" y="connsiteY3"/>
+              </a:cxn>
+              <a:cxn ang="0">
+                <a:pos x="connsiteX4" y="connsiteY4"/>
+              </a:cxn>
+            </a:cxnLst>
+            <a:rect l="l" t="t" r="r" b="b"/>
+            <a:pathLst>
+              <a:path w="1215342" h="1250355">
+                <a:moveTo>
+                  <a:pt x="0" y="1250355"/>
+                </a:moveTo>
+                <a:cubicBezTo>
+                  <a:pt x="125392" y="1128820"/>
+                  <a:pt x="250785" y="1007286"/>
+                  <a:pt x="358815" y="798942"/>
+                </a:cubicBezTo>
+                <a:cubicBezTo>
+                  <a:pt x="466845" y="590598"/>
+                  <a:pt x="551726" y="-15144"/>
+                  <a:pt x="648182" y="289"/>
+                </a:cubicBezTo>
+                <a:cubicBezTo>
+                  <a:pt x="744638" y="15722"/>
+                  <a:pt x="843022" y="683195"/>
+                  <a:pt x="937549" y="891539"/>
+                </a:cubicBezTo>
+                <a:cubicBezTo>
+                  <a:pt x="1032076" y="1099883"/>
+                  <a:pt x="1174831" y="1190552"/>
+                  <a:pt x="1215342" y="1250355"/>
+                </a:cubicBezTo>
+              </a:path>
+            </a:pathLst>
+          </a:custGeom>
+          <a:noFill/>
+          <a:ln w="38100">
+            <a:solidFill>
+              <a:schemeClr val="accent2">
+                <a:lumMod val="75000"/>
+              </a:schemeClr>
+            </a:solidFill>
+          </a:ln>
+        </p:spPr>
+        <p:style>
+          <a:lnRef idx="2">
+            <a:schemeClr val="accent1">
+              <a:shade val="50000"/>
+            </a:schemeClr>
+          </a:lnRef>
+          <a:fillRef idx="1">
+            <a:schemeClr val="accent1"/>
+          </a:fillRef>
+          <a:effectRef idx="0">
+            <a:schemeClr val="accent1"/>
+          </a:effectRef>
+          <a:fontRef idx="minor">
+            <a:schemeClr val="lt1"/>
+          </a:fontRef>
+        </p:style>
+        <p:txBody>
+          <a:bodyPr rtlCol="0" anchor="ctr"/>
+          <a:lstStyle/>
+          <a:p>
+            <a:pPr algn="ctr"/>
+            <a:endParaRPr lang="en-US"/>
+          </a:p>
+        </p:txBody>
+      </p:sp>
+      <p:sp>
+        <p:nvSpPr>
+          <p:cNvPr id="115" name="Freeform 114"/>
+          <p:cNvSpPr/>
+          <p:nvPr/>
+        </p:nvSpPr>
+        <p:spPr>
+          <a:xfrm>
+            <a:off x="5578726" y="4420473"/>
+            <a:ext cx="1242770" cy="1533329"/>
+          </a:xfrm>
+          <a:custGeom>
+            <a:avLst/>
+            <a:gdLst>
+              <a:gd name="connsiteX0" fmla="*/ 0 w 1215342"/>
+              <a:gd name="connsiteY0" fmla="*/ 1250355 h 1250355"/>
+              <a:gd name="connsiteX1" fmla="*/ 358815 w 1215342"/>
+              <a:gd name="connsiteY1" fmla="*/ 798942 h 1250355"/>
+              <a:gd name="connsiteX2" fmla="*/ 648182 w 1215342"/>
+              <a:gd name="connsiteY2" fmla="*/ 289 h 1250355"/>
+              <a:gd name="connsiteX3" fmla="*/ 937549 w 1215342"/>
+              <a:gd name="connsiteY3" fmla="*/ 891539 h 1250355"/>
+              <a:gd name="connsiteX4" fmla="*/ 1215342 w 1215342"/>
+              <a:gd name="connsiteY4" fmla="*/ 1250355 h 1250355"/>
+            </a:gdLst>
+            <a:ahLst/>
+            <a:cxnLst>
+              <a:cxn ang="0">
+                <a:pos x="connsiteX0" y="connsiteY0"/>
+              </a:cxn>
+              <a:cxn ang="0">
+                <a:pos x="connsiteX1" y="connsiteY1"/>
+              </a:cxn>
+              <a:cxn ang="0">
+                <a:pos x="connsiteX2" y="connsiteY2"/>
+              </a:cxn>
+              <a:cxn ang="0">
+                <a:pos x="connsiteX3" y="connsiteY3"/>
+              </a:cxn>
+              <a:cxn ang="0">
+                <a:pos x="connsiteX4" y="connsiteY4"/>
+              </a:cxn>
+            </a:cxnLst>
+            <a:rect l="l" t="t" r="r" b="b"/>
+            <a:pathLst>
+              <a:path w="1215342" h="1250355">
+                <a:moveTo>
+                  <a:pt x="0" y="1250355"/>
+                </a:moveTo>
+                <a:cubicBezTo>
+                  <a:pt x="125392" y="1128820"/>
+                  <a:pt x="250785" y="1007286"/>
+                  <a:pt x="358815" y="798942"/>
+                </a:cubicBezTo>
+                <a:cubicBezTo>
+                  <a:pt x="466845" y="590598"/>
+                  <a:pt x="551726" y="-15144"/>
+                  <a:pt x="648182" y="289"/>
+                </a:cubicBezTo>
+                <a:cubicBezTo>
+                  <a:pt x="744638" y="15722"/>
+                  <a:pt x="843022" y="683195"/>
+                  <a:pt x="937549" y="891539"/>
+                </a:cubicBezTo>
+                <a:cubicBezTo>
+                  <a:pt x="1032076" y="1099883"/>
+                  <a:pt x="1174831" y="1190552"/>
+                  <a:pt x="1215342" y="1250355"/>
+                </a:cubicBezTo>
+              </a:path>
+            </a:pathLst>
+          </a:custGeom>
+          <a:noFill/>
+          <a:ln w="38100">
+            <a:solidFill>
+              <a:schemeClr val="bg2">
+                <a:lumMod val="50000"/>
+              </a:schemeClr>
+            </a:solidFill>
+          </a:ln>
+        </p:spPr>
+        <p:style>
+          <a:lnRef idx="2">
+            <a:schemeClr val="accent1">
+              <a:shade val="50000"/>
+            </a:schemeClr>
+          </a:lnRef>
+          <a:fillRef idx="1">
+            <a:schemeClr val="accent1"/>
+          </a:fillRef>
+          <a:effectRef idx="0">
+            <a:schemeClr val="accent1"/>
+          </a:effectRef>
+          <a:fontRef idx="minor">
+            <a:schemeClr val="lt1"/>
+          </a:fontRef>
+        </p:style>
+        <p:txBody>
+          <a:bodyPr rtlCol="0" anchor="ctr"/>
+          <a:lstStyle/>
+          <a:p>
+            <a:pPr algn="ctr"/>
+            <a:endParaRPr lang="en-US"/>
+          </a:p>
+        </p:txBody>
+      </p:sp>
+      <p:sp>
+        <p:nvSpPr>
+          <p:cNvPr id="119" name="Freeform 118"/>
+          <p:cNvSpPr/>
+          <p:nvPr/>
+        </p:nvSpPr>
+        <p:spPr>
+          <a:xfrm>
+            <a:off x="8091968" y="1691333"/>
+            <a:ext cx="1734665" cy="1250355"/>
+          </a:xfrm>
+          <a:custGeom>
+            <a:avLst/>
+            <a:gdLst>
+              <a:gd name="connsiteX0" fmla="*/ 0 w 1215342"/>
+              <a:gd name="connsiteY0" fmla="*/ 1250355 h 1250355"/>
+              <a:gd name="connsiteX1" fmla="*/ 358815 w 1215342"/>
+              <a:gd name="connsiteY1" fmla="*/ 798942 h 1250355"/>
+              <a:gd name="connsiteX2" fmla="*/ 648182 w 1215342"/>
+              <a:gd name="connsiteY2" fmla="*/ 289 h 1250355"/>
+              <a:gd name="connsiteX3" fmla="*/ 937549 w 1215342"/>
+              <a:gd name="connsiteY3" fmla="*/ 891539 h 1250355"/>
+              <a:gd name="connsiteX4" fmla="*/ 1215342 w 1215342"/>
+              <a:gd name="connsiteY4" fmla="*/ 1250355 h 1250355"/>
+            </a:gdLst>
+            <a:ahLst/>
+            <a:cxnLst>
+              <a:cxn ang="0">
+                <a:pos x="connsiteX0" y="connsiteY0"/>
+              </a:cxn>
+              <a:cxn ang="0">
+                <a:pos x="connsiteX1" y="connsiteY1"/>
+              </a:cxn>
+              <a:cxn ang="0">
+                <a:pos x="connsiteX2" y="connsiteY2"/>
+              </a:cxn>
+              <a:cxn ang="0">
+                <a:pos x="connsiteX3" y="connsiteY3"/>
+              </a:cxn>
+              <a:cxn ang="0">
+                <a:pos x="connsiteX4" y="connsiteY4"/>
+              </a:cxn>
+            </a:cxnLst>
+            <a:rect l="l" t="t" r="r" b="b"/>
+            <a:pathLst>
+              <a:path w="1215342" h="1250355">
+                <a:moveTo>
+                  <a:pt x="0" y="1250355"/>
+                </a:moveTo>
+                <a:cubicBezTo>
+                  <a:pt x="125392" y="1128820"/>
+                  <a:pt x="250785" y="1007286"/>
+                  <a:pt x="358815" y="798942"/>
+                </a:cubicBezTo>
+                <a:cubicBezTo>
+                  <a:pt x="466845" y="590598"/>
+                  <a:pt x="551726" y="-15144"/>
+                  <a:pt x="648182" y="289"/>
+                </a:cubicBezTo>
+                <a:cubicBezTo>
+                  <a:pt x="744638" y="15722"/>
+                  <a:pt x="843022" y="683195"/>
+                  <a:pt x="937549" y="891539"/>
+                </a:cubicBezTo>
+                <a:cubicBezTo>
+                  <a:pt x="1032076" y="1099883"/>
+                  <a:pt x="1174831" y="1190552"/>
+                  <a:pt x="1215342" y="1250355"/>
+                </a:cubicBezTo>
+              </a:path>
+            </a:pathLst>
+          </a:custGeom>
+          <a:noFill/>
+          <a:ln w="38100">
+            <a:solidFill>
+              <a:srgbClr val="7030A0"/>
+            </a:solidFill>
+          </a:ln>
+        </p:spPr>
+        <p:style>
+          <a:lnRef idx="2">
+            <a:schemeClr val="accent1">
+              <a:shade val="50000"/>
+            </a:schemeClr>
+          </a:lnRef>
+          <a:fillRef idx="1">
+            <a:schemeClr val="accent1"/>
+          </a:fillRef>
+          <a:effectRef idx="0">
+            <a:schemeClr val="accent1"/>
+          </a:effectRef>
+          <a:fontRef idx="minor">
+            <a:schemeClr val="lt1"/>
+          </a:fontRef>
+        </p:style>
+        <p:txBody>
+          <a:bodyPr rtlCol="0" anchor="ctr"/>
+          <a:lstStyle/>
+          <a:p>
+            <a:pPr algn="ctr"/>
+            <a:endParaRPr lang="en-US"/>
+          </a:p>
+        </p:txBody>
+      </p:sp>
+      <p:sp>
+        <p:nvSpPr>
+          <p:cNvPr id="120" name="Freeform 119"/>
+          <p:cNvSpPr/>
+          <p:nvPr/>
+        </p:nvSpPr>
+        <p:spPr>
+          <a:xfrm>
+            <a:off x="7955873" y="1802550"/>
+            <a:ext cx="1440241" cy="1155127"/>
+          </a:xfrm>
+          <a:custGeom>
+            <a:avLst/>
+            <a:gdLst>
+              <a:gd name="connsiteX0" fmla="*/ 0 w 1215342"/>
+              <a:gd name="connsiteY0" fmla="*/ 1250355 h 1250355"/>
+              <a:gd name="connsiteX1" fmla="*/ 358815 w 1215342"/>
+              <a:gd name="connsiteY1" fmla="*/ 798942 h 1250355"/>
+              <a:gd name="connsiteX2" fmla="*/ 648182 w 1215342"/>
+              <a:gd name="connsiteY2" fmla="*/ 289 h 1250355"/>
+              <a:gd name="connsiteX3" fmla="*/ 937549 w 1215342"/>
+              <a:gd name="connsiteY3" fmla="*/ 891539 h 1250355"/>
+              <a:gd name="connsiteX4" fmla="*/ 1215342 w 1215342"/>
+              <a:gd name="connsiteY4" fmla="*/ 1250355 h 1250355"/>
+            </a:gdLst>
+            <a:ahLst/>
+            <a:cxnLst>
+              <a:cxn ang="0">
+                <a:pos x="connsiteX0" y="connsiteY0"/>
+              </a:cxn>
+              <a:cxn ang="0">
+                <a:pos x="connsiteX1" y="connsiteY1"/>
+              </a:cxn>
+              <a:cxn ang="0">
+                <a:pos x="connsiteX2" y="connsiteY2"/>
+              </a:cxn>
+              <a:cxn ang="0">
+                <a:pos x="connsiteX3" y="connsiteY3"/>
+              </a:cxn>
+              <a:cxn ang="0">
+                <a:pos x="connsiteX4" y="connsiteY4"/>
+              </a:cxn>
+            </a:cxnLst>
+            <a:rect l="l" t="t" r="r" b="b"/>
+            <a:pathLst>
+              <a:path w="1215342" h="1250355">
+                <a:moveTo>
+                  <a:pt x="0" y="1250355"/>
+                </a:moveTo>
+                <a:cubicBezTo>
+                  <a:pt x="125392" y="1128820"/>
+                  <a:pt x="250785" y="1007286"/>
+                  <a:pt x="358815" y="798942"/>
+                </a:cubicBezTo>
+                <a:cubicBezTo>
+                  <a:pt x="466845" y="590598"/>
+                  <a:pt x="551726" y="-15144"/>
+                  <a:pt x="648182" y="289"/>
+                </a:cubicBezTo>
+                <a:cubicBezTo>
+                  <a:pt x="744638" y="15722"/>
+                  <a:pt x="843022" y="683195"/>
+                  <a:pt x="937549" y="891539"/>
+                </a:cubicBezTo>
+                <a:cubicBezTo>
+                  <a:pt x="1032076" y="1099883"/>
+                  <a:pt x="1174831" y="1190552"/>
+                  <a:pt x="1215342" y="1250355"/>
+                </a:cubicBezTo>
+              </a:path>
+            </a:pathLst>
+          </a:custGeom>
+          <a:noFill/>
+          <a:ln w="38100">
+            <a:solidFill>
+              <a:schemeClr val="accent2">
+                <a:lumMod val="75000"/>
+              </a:schemeClr>
+            </a:solidFill>
+          </a:ln>
+        </p:spPr>
+        <p:style>
+          <a:lnRef idx="2">
+            <a:schemeClr val="accent1">
+              <a:shade val="50000"/>
+            </a:schemeClr>
+          </a:lnRef>
+          <a:fillRef idx="1">
+            <a:schemeClr val="accent1"/>
+          </a:fillRef>
+          <a:effectRef idx="0">
+            <a:schemeClr val="accent1"/>
+          </a:effectRef>
+          <a:fontRef idx="minor">
+            <a:schemeClr val="lt1"/>
+          </a:fontRef>
+        </p:style>
+        <p:txBody>
+          <a:bodyPr rtlCol="0" anchor="ctr"/>
+          <a:lstStyle/>
+          <a:p>
+            <a:pPr algn="ctr"/>
+            <a:endParaRPr lang="en-US"/>
+          </a:p>
+        </p:txBody>
+      </p:sp>
+      <p:sp>
+        <p:nvSpPr>
+          <p:cNvPr id="121" name="Freeform 120"/>
+          <p:cNvSpPr/>
+          <p:nvPr/>
+        </p:nvSpPr>
+        <p:spPr>
+          <a:xfrm>
+            <a:off x="9005828" y="1433147"/>
+            <a:ext cx="1242770" cy="1533329"/>
+          </a:xfrm>
+          <a:custGeom>
+            <a:avLst/>
+            <a:gdLst>
+              <a:gd name="connsiteX0" fmla="*/ 0 w 1215342"/>
+              <a:gd name="connsiteY0" fmla="*/ 1250355 h 1250355"/>
+              <a:gd name="connsiteX1" fmla="*/ 358815 w 1215342"/>
+              <a:gd name="connsiteY1" fmla="*/ 798942 h 1250355"/>
+              <a:gd name="connsiteX2" fmla="*/ 648182 w 1215342"/>
+              <a:gd name="connsiteY2" fmla="*/ 289 h 1250355"/>
+              <a:gd name="connsiteX3" fmla="*/ 937549 w 1215342"/>
+              <a:gd name="connsiteY3" fmla="*/ 891539 h 1250355"/>
+              <a:gd name="connsiteX4" fmla="*/ 1215342 w 1215342"/>
+              <a:gd name="connsiteY4" fmla="*/ 1250355 h 1250355"/>
+            </a:gdLst>
+            <a:ahLst/>
+            <a:cxnLst>
+              <a:cxn ang="0">
+                <a:pos x="connsiteX0" y="connsiteY0"/>
+              </a:cxn>
+              <a:cxn ang="0">
+                <a:pos x="connsiteX1" y="connsiteY1"/>
+              </a:cxn>
+              <a:cxn ang="0">
+                <a:pos x="connsiteX2" y="connsiteY2"/>
+              </a:cxn>
+              <a:cxn ang="0">
+                <a:pos x="connsiteX3" y="connsiteY3"/>
+              </a:cxn>
+              <a:cxn ang="0">
+                <a:pos x="connsiteX4" y="connsiteY4"/>
+              </a:cxn>
+            </a:cxnLst>
+            <a:rect l="l" t="t" r="r" b="b"/>
+            <a:pathLst>
+              <a:path w="1215342" h="1250355">
+                <a:moveTo>
+                  <a:pt x="0" y="1250355"/>
+                </a:moveTo>
+                <a:cubicBezTo>
+                  <a:pt x="125392" y="1128820"/>
+                  <a:pt x="250785" y="1007286"/>
+                  <a:pt x="358815" y="798942"/>
+                </a:cubicBezTo>
+                <a:cubicBezTo>
+                  <a:pt x="466845" y="590598"/>
+                  <a:pt x="551726" y="-15144"/>
+                  <a:pt x="648182" y="289"/>
+                </a:cubicBezTo>
+                <a:cubicBezTo>
+                  <a:pt x="744638" y="15722"/>
+                  <a:pt x="843022" y="683195"/>
+                  <a:pt x="937549" y="891539"/>
+                </a:cubicBezTo>
+                <a:cubicBezTo>
+                  <a:pt x="1032076" y="1099883"/>
+                  <a:pt x="1174831" y="1190552"/>
+                  <a:pt x="1215342" y="1250355"/>
+                </a:cubicBezTo>
+              </a:path>
+            </a:pathLst>
+          </a:custGeom>
+          <a:noFill/>
+          <a:ln w="38100">
+            <a:solidFill>
+              <a:schemeClr val="bg2">
+                <a:lumMod val="50000"/>
+              </a:schemeClr>
+            </a:solidFill>
+          </a:ln>
+        </p:spPr>
+        <p:style>
+          <a:lnRef idx="2">
+            <a:schemeClr val="accent1">
+              <a:shade val="50000"/>
+            </a:schemeClr>
+          </a:lnRef>
+          <a:fillRef idx="1">
+            <a:schemeClr val="accent1"/>
+          </a:fillRef>
+          <a:effectRef idx="0">
+            <a:schemeClr val="accent1"/>
+          </a:effectRef>
+          <a:fontRef idx="minor">
+            <a:schemeClr val="lt1"/>
+          </a:fontRef>
+        </p:style>
+        <p:txBody>
+          <a:bodyPr rtlCol="0" anchor="ctr"/>
+          <a:lstStyle/>
+          <a:p>
+            <a:pPr algn="ctr"/>
+            <a:endParaRPr lang="en-US"/>
+          </a:p>
+        </p:txBody>
+      </p:sp>
+      <p:sp>
+        <p:nvSpPr>
+          <p:cNvPr id="122" name="Freeform 121"/>
+          <p:cNvSpPr/>
+          <p:nvPr/>
+        </p:nvSpPr>
+        <p:spPr>
+          <a:xfrm>
+            <a:off x="8117079" y="4675764"/>
+            <a:ext cx="1734665" cy="1250355"/>
+          </a:xfrm>
+          <a:custGeom>
+            <a:avLst/>
+            <a:gdLst>
+              <a:gd name="connsiteX0" fmla="*/ 0 w 1215342"/>
+              <a:gd name="connsiteY0" fmla="*/ 1250355 h 1250355"/>
+              <a:gd name="connsiteX1" fmla="*/ 358815 w 1215342"/>
+              <a:gd name="connsiteY1" fmla="*/ 798942 h 1250355"/>
+              <a:gd name="connsiteX2" fmla="*/ 648182 w 1215342"/>
+              <a:gd name="connsiteY2" fmla="*/ 289 h 1250355"/>
+              <a:gd name="connsiteX3" fmla="*/ 937549 w 1215342"/>
+              <a:gd name="connsiteY3" fmla="*/ 891539 h 1250355"/>
+              <a:gd name="connsiteX4" fmla="*/ 1215342 w 1215342"/>
+              <a:gd name="connsiteY4" fmla="*/ 1250355 h 1250355"/>
+            </a:gdLst>
+            <a:ahLst/>
+            <a:cxnLst>
+              <a:cxn ang="0">
+                <a:pos x="connsiteX0" y="connsiteY0"/>
+              </a:cxn>
+              <a:cxn ang="0">
+                <a:pos x="connsiteX1" y="connsiteY1"/>
+              </a:cxn>
+              <a:cxn ang="0">
+                <a:pos x="connsiteX2" y="connsiteY2"/>
+              </a:cxn>
+              <a:cxn ang="0">
+                <a:pos x="connsiteX3" y="connsiteY3"/>
+              </a:cxn>
+              <a:cxn ang="0">
+                <a:pos x="connsiteX4" y="connsiteY4"/>
+              </a:cxn>
+            </a:cxnLst>
+            <a:rect l="l" t="t" r="r" b="b"/>
+            <a:pathLst>
+              <a:path w="1215342" h="1250355">
+                <a:moveTo>
+                  <a:pt x="0" y="1250355"/>
+                </a:moveTo>
+                <a:cubicBezTo>
+                  <a:pt x="125392" y="1128820"/>
+                  <a:pt x="250785" y="1007286"/>
+                  <a:pt x="358815" y="798942"/>
+                </a:cubicBezTo>
+                <a:cubicBezTo>
+                  <a:pt x="466845" y="590598"/>
+                  <a:pt x="551726" y="-15144"/>
+                  <a:pt x="648182" y="289"/>
+                </a:cubicBezTo>
+                <a:cubicBezTo>
+                  <a:pt x="744638" y="15722"/>
+                  <a:pt x="843022" y="683195"/>
+                  <a:pt x="937549" y="891539"/>
+                </a:cubicBezTo>
+                <a:cubicBezTo>
+                  <a:pt x="1032076" y="1099883"/>
+                  <a:pt x="1174831" y="1190552"/>
+                  <a:pt x="1215342" y="1250355"/>
+                </a:cubicBezTo>
+              </a:path>
+            </a:pathLst>
+          </a:custGeom>
+          <a:noFill/>
+          <a:ln w="38100">
+            <a:solidFill>
+              <a:srgbClr val="7030A0"/>
+            </a:solidFill>
+          </a:ln>
+        </p:spPr>
+        <p:style>
+          <a:lnRef idx="2">
+            <a:schemeClr val="accent1">
+              <a:shade val="50000"/>
+            </a:schemeClr>
+          </a:lnRef>
+          <a:fillRef idx="1">
+            <a:schemeClr val="accent1"/>
+          </a:fillRef>
+          <a:effectRef idx="0">
+            <a:schemeClr val="accent1"/>
+          </a:effectRef>
+          <a:fontRef idx="minor">
+            <a:schemeClr val="lt1"/>
+          </a:fontRef>
+        </p:style>
+        <p:txBody>
+          <a:bodyPr rtlCol="0" anchor="ctr"/>
+          <a:lstStyle/>
+          <a:p>
+            <a:pPr algn="ctr"/>
+            <a:endParaRPr lang="en-US"/>
+          </a:p>
+        </p:txBody>
+      </p:sp>
+      <p:sp>
+        <p:nvSpPr>
+          <p:cNvPr id="123" name="Freeform 122"/>
+          <p:cNvSpPr/>
+          <p:nvPr/>
+        </p:nvSpPr>
+        <p:spPr>
+          <a:xfrm>
+            <a:off x="7980984" y="4786981"/>
+            <a:ext cx="1440241" cy="1155127"/>
+          </a:xfrm>
+          <a:custGeom>
+            <a:avLst/>
+            <a:gdLst>
+              <a:gd name="connsiteX0" fmla="*/ 0 w 1215342"/>
+              <a:gd name="connsiteY0" fmla="*/ 1250355 h 1250355"/>
+              <a:gd name="connsiteX1" fmla="*/ 358815 w 1215342"/>
+              <a:gd name="connsiteY1" fmla="*/ 798942 h 1250355"/>
+              <a:gd name="connsiteX2" fmla="*/ 648182 w 1215342"/>
+              <a:gd name="connsiteY2" fmla="*/ 289 h 1250355"/>
+              <a:gd name="connsiteX3" fmla="*/ 937549 w 1215342"/>
+              <a:gd name="connsiteY3" fmla="*/ 891539 h 1250355"/>
+              <a:gd name="connsiteX4" fmla="*/ 1215342 w 1215342"/>
+              <a:gd name="connsiteY4" fmla="*/ 1250355 h 1250355"/>
+            </a:gdLst>
+            <a:ahLst/>
+            <a:cxnLst>
+              <a:cxn ang="0">
+                <a:pos x="connsiteX0" y="connsiteY0"/>
+              </a:cxn>
+              <a:cxn ang="0">
+                <a:pos x="connsiteX1" y="connsiteY1"/>
+              </a:cxn>
+              <a:cxn ang="0">
+                <a:pos x="connsiteX2" y="connsiteY2"/>
+              </a:cxn>
+              <a:cxn ang="0">
+                <a:pos x="connsiteX3" y="connsiteY3"/>
+              </a:cxn>
+              <a:cxn ang="0">
+                <a:pos x="connsiteX4" y="connsiteY4"/>
+              </a:cxn>
+            </a:cxnLst>
+            <a:rect l="l" t="t" r="r" b="b"/>
+            <a:pathLst>
+              <a:path w="1215342" h="1250355">
+                <a:moveTo>
+                  <a:pt x="0" y="1250355"/>
+                </a:moveTo>
+                <a:cubicBezTo>
+                  <a:pt x="125392" y="1128820"/>
+                  <a:pt x="250785" y="1007286"/>
+                  <a:pt x="358815" y="798942"/>
+                </a:cubicBezTo>
+                <a:cubicBezTo>
+                  <a:pt x="466845" y="590598"/>
+                  <a:pt x="551726" y="-15144"/>
+                  <a:pt x="648182" y="289"/>
+                </a:cubicBezTo>
+                <a:cubicBezTo>
+                  <a:pt x="744638" y="15722"/>
+                  <a:pt x="843022" y="683195"/>
+                  <a:pt x="937549" y="891539"/>
+                </a:cubicBezTo>
+                <a:cubicBezTo>
+                  <a:pt x="1032076" y="1099883"/>
+                  <a:pt x="1174831" y="1190552"/>
+                  <a:pt x="1215342" y="1250355"/>
+                </a:cubicBezTo>
+              </a:path>
+            </a:pathLst>
+          </a:custGeom>
+          <a:noFill/>
+          <a:ln w="38100">
+            <a:solidFill>
+              <a:schemeClr val="accent2">
+                <a:lumMod val="75000"/>
+              </a:schemeClr>
+            </a:solidFill>
+          </a:ln>
+        </p:spPr>
+        <p:style>
+          <a:lnRef idx="2">
+            <a:schemeClr val="accent1">
+              <a:shade val="50000"/>
+            </a:schemeClr>
+          </a:lnRef>
+          <a:fillRef idx="1">
+            <a:schemeClr val="accent1"/>
+          </a:fillRef>
+          <a:effectRef idx="0">
+            <a:schemeClr val="accent1"/>
+          </a:effectRef>
+          <a:fontRef idx="minor">
+            <a:schemeClr val="lt1"/>
+          </a:fontRef>
+        </p:style>
+        <p:txBody>
+          <a:bodyPr rtlCol="0" anchor="ctr"/>
+          <a:lstStyle/>
+          <a:p>
+            <a:pPr algn="ctr"/>
+            <a:endParaRPr lang="en-US"/>
+          </a:p>
+        </p:txBody>
+      </p:sp>
+      <p:sp>
+        <p:nvSpPr>
+          <p:cNvPr id="124" name="Freeform 123"/>
+          <p:cNvSpPr/>
+          <p:nvPr/>
+        </p:nvSpPr>
+        <p:spPr>
+          <a:xfrm>
+            <a:off x="8993986" y="4420473"/>
+            <a:ext cx="1242770" cy="1533329"/>
+          </a:xfrm>
+          <a:custGeom>
+            <a:avLst/>
+            <a:gdLst>
+              <a:gd name="connsiteX0" fmla="*/ 0 w 1215342"/>
+              <a:gd name="connsiteY0" fmla="*/ 1250355 h 1250355"/>
+              <a:gd name="connsiteX1" fmla="*/ 358815 w 1215342"/>
+              <a:gd name="connsiteY1" fmla="*/ 798942 h 1250355"/>
+              <a:gd name="connsiteX2" fmla="*/ 648182 w 1215342"/>
+              <a:gd name="connsiteY2" fmla="*/ 289 h 1250355"/>
+              <a:gd name="connsiteX3" fmla="*/ 937549 w 1215342"/>
+              <a:gd name="connsiteY3" fmla="*/ 891539 h 1250355"/>
+              <a:gd name="connsiteX4" fmla="*/ 1215342 w 1215342"/>
+              <a:gd name="connsiteY4" fmla="*/ 1250355 h 1250355"/>
+            </a:gdLst>
+            <a:ahLst/>
+            <a:cxnLst>
+              <a:cxn ang="0">
+                <a:pos x="connsiteX0" y="connsiteY0"/>
+              </a:cxn>
+              <a:cxn ang="0">
+                <a:pos x="connsiteX1" y="connsiteY1"/>
+              </a:cxn>
+              <a:cxn ang="0">
+                <a:pos x="connsiteX2" y="connsiteY2"/>
+              </a:cxn>
+              <a:cxn ang="0">
+                <a:pos x="connsiteX3" y="connsiteY3"/>
+              </a:cxn>
+              <a:cxn ang="0">
+                <a:pos x="connsiteX4" y="connsiteY4"/>
+              </a:cxn>
+            </a:cxnLst>
+            <a:rect l="l" t="t" r="r" b="b"/>
+            <a:pathLst>
+              <a:path w="1215342" h="1250355">
+                <a:moveTo>
+                  <a:pt x="0" y="1250355"/>
+                </a:moveTo>
+                <a:cubicBezTo>
+                  <a:pt x="125392" y="1128820"/>
+                  <a:pt x="250785" y="1007286"/>
+                  <a:pt x="358815" y="798942"/>
+                </a:cubicBezTo>
+                <a:cubicBezTo>
+                  <a:pt x="466845" y="590598"/>
+                  <a:pt x="551726" y="-15144"/>
+                  <a:pt x="648182" y="289"/>
+                </a:cubicBezTo>
+                <a:cubicBezTo>
+                  <a:pt x="744638" y="15722"/>
+                  <a:pt x="843022" y="683195"/>
+                  <a:pt x="937549" y="891539"/>
+                </a:cubicBezTo>
+                <a:cubicBezTo>
+                  <a:pt x="1032076" y="1099883"/>
+                  <a:pt x="1174831" y="1190552"/>
+                  <a:pt x="1215342" y="1250355"/>
+                </a:cubicBezTo>
+              </a:path>
+            </a:pathLst>
+          </a:custGeom>
+          <a:noFill/>
+          <a:ln w="38100">
+            <a:solidFill>
+              <a:schemeClr val="bg2">
+                <a:lumMod val="50000"/>
+              </a:schemeClr>
+            </a:solidFill>
+          </a:ln>
+        </p:spPr>
+        <p:style>
+          <a:lnRef idx="2">
+            <a:schemeClr val="accent1">
+              <a:shade val="50000"/>
+            </a:schemeClr>
+          </a:lnRef>
+          <a:fillRef idx="1">
+            <a:schemeClr val="accent1"/>
+          </a:fillRef>
+          <a:effectRef idx="0">
+            <a:schemeClr val="accent1"/>
+          </a:effectRef>
+          <a:fontRef idx="minor">
+            <a:schemeClr val="lt1"/>
+          </a:fontRef>
+        </p:style>
+        <p:txBody>
+          <a:bodyPr rtlCol="0" anchor="ctr"/>
+          <a:lstStyle/>
+          <a:p>
+            <a:pPr algn="ctr"/>
+            <a:endParaRPr lang="en-US"/>
           </a:p>
         </p:txBody>
       </p:sp>
@@ -6267,6 +5995,13 @@
   <p:clrMapOvr>
     <a:masterClrMapping/>
   </p:clrMapOvr>
+  <p:timing>
+    <p:tnLst>
+      <p:par>
+        <p:cTn id="1" dur="indefinite" restart="never" nodeType="tmRoot"/>
+      </p:par>
+    </p:tnLst>
+  </p:timing>
 </p:sld>
 </file>
 

</xml_diff>

<commit_message>
cleaning up the data so its useable
</commit_message>
<xml_diff>
--- a/images/sketch_of_college_scorecard.pptx
+++ b/images/sketch_of_college_scorecard.pptx
@@ -251,7 +251,7 @@
           <a:p>
             <a:fld id="{2AC6034D-18FF-1D4A-AE20-BE0D231E5063}" type="datetimeFigureOut">
               <a:rPr lang="en-US" smtClean="0"/>
-              <a:t>1/12/19</a:t>
+              <a:t>1/13/19</a:t>
             </a:fld>
             <a:endParaRPr lang="en-US"/>
           </a:p>
@@ -421,7 +421,7 @@
           <a:p>
             <a:fld id="{2AC6034D-18FF-1D4A-AE20-BE0D231E5063}" type="datetimeFigureOut">
               <a:rPr lang="en-US" smtClean="0"/>
-              <a:t>1/12/19</a:t>
+              <a:t>1/13/19</a:t>
             </a:fld>
             <a:endParaRPr lang="en-US"/>
           </a:p>
@@ -601,7 +601,7 @@
           <a:p>
             <a:fld id="{2AC6034D-18FF-1D4A-AE20-BE0D231E5063}" type="datetimeFigureOut">
               <a:rPr lang="en-US" smtClean="0"/>
-              <a:t>1/12/19</a:t>
+              <a:t>1/13/19</a:t>
             </a:fld>
             <a:endParaRPr lang="en-US"/>
           </a:p>
@@ -771,7 +771,7 @@
           <a:p>
             <a:fld id="{2AC6034D-18FF-1D4A-AE20-BE0D231E5063}" type="datetimeFigureOut">
               <a:rPr lang="en-US" smtClean="0"/>
-              <a:t>1/12/19</a:t>
+              <a:t>1/13/19</a:t>
             </a:fld>
             <a:endParaRPr lang="en-US"/>
           </a:p>
@@ -1017,7 +1017,7 @@
           <a:p>
             <a:fld id="{2AC6034D-18FF-1D4A-AE20-BE0D231E5063}" type="datetimeFigureOut">
               <a:rPr lang="en-US" smtClean="0"/>
-              <a:t>1/12/19</a:t>
+              <a:t>1/13/19</a:t>
             </a:fld>
             <a:endParaRPr lang="en-US"/>
           </a:p>
@@ -1249,7 +1249,7 @@
           <a:p>
             <a:fld id="{2AC6034D-18FF-1D4A-AE20-BE0D231E5063}" type="datetimeFigureOut">
               <a:rPr lang="en-US" smtClean="0"/>
-              <a:t>1/12/19</a:t>
+              <a:t>1/13/19</a:t>
             </a:fld>
             <a:endParaRPr lang="en-US"/>
           </a:p>
@@ -1616,7 +1616,7 @@
           <a:p>
             <a:fld id="{2AC6034D-18FF-1D4A-AE20-BE0D231E5063}" type="datetimeFigureOut">
               <a:rPr lang="en-US" smtClean="0"/>
-              <a:t>1/12/19</a:t>
+              <a:t>1/13/19</a:t>
             </a:fld>
             <a:endParaRPr lang="en-US"/>
           </a:p>
@@ -1734,7 +1734,7 @@
           <a:p>
             <a:fld id="{2AC6034D-18FF-1D4A-AE20-BE0D231E5063}" type="datetimeFigureOut">
               <a:rPr lang="en-US" smtClean="0"/>
-              <a:t>1/12/19</a:t>
+              <a:t>1/13/19</a:t>
             </a:fld>
             <a:endParaRPr lang="en-US"/>
           </a:p>
@@ -1829,7 +1829,7 @@
           <a:p>
             <a:fld id="{2AC6034D-18FF-1D4A-AE20-BE0D231E5063}" type="datetimeFigureOut">
               <a:rPr lang="en-US" smtClean="0"/>
-              <a:t>1/12/19</a:t>
+              <a:t>1/13/19</a:t>
             </a:fld>
             <a:endParaRPr lang="en-US"/>
           </a:p>
@@ -2106,7 +2106,7 @@
           <a:p>
             <a:fld id="{2AC6034D-18FF-1D4A-AE20-BE0D231E5063}" type="datetimeFigureOut">
               <a:rPr lang="en-US" smtClean="0"/>
-              <a:t>1/12/19</a:t>
+              <a:t>1/13/19</a:t>
             </a:fld>
             <a:endParaRPr lang="en-US"/>
           </a:p>
@@ -2359,7 +2359,7 @@
           <a:p>
             <a:fld id="{2AC6034D-18FF-1D4A-AE20-BE0D231E5063}" type="datetimeFigureOut">
               <a:rPr lang="en-US" smtClean="0"/>
-              <a:t>1/12/19</a:t>
+              <a:t>1/13/19</a:t>
             </a:fld>
             <a:endParaRPr lang="en-US"/>
           </a:p>
@@ -2572,7 +2572,7 @@
           <a:p>
             <a:fld id="{2AC6034D-18FF-1D4A-AE20-BE0D231E5063}" type="datetimeFigureOut">
               <a:rPr lang="en-US" smtClean="0"/>
-              <a:t>1/12/19</a:t>
+              <a:t>1/13/19</a:t>
             </a:fld>
             <a:endParaRPr lang="en-US"/>
           </a:p>
@@ -3113,15 +3113,7 @@
                 <a:ea typeface="Arial" charset="0"/>
                 <a:cs typeface="Arial" charset="0"/>
               </a:rPr>
-              <a:t>Total </a:t>
-            </a:r>
-            <a:r>
-              <a:rPr lang="en-US" sz="1400" dirty="0" smtClean="0">
-                <a:latin typeface="Arial" charset="0"/>
-                <a:ea typeface="Arial" charset="0"/>
-                <a:cs typeface="Arial" charset="0"/>
-              </a:rPr>
-              <a:t>Number of </a:t>
+              <a:t>Total Number of </a:t>
             </a:r>
             <a:r>
               <a:rPr lang="en-US" sz="1400" dirty="0">
@@ -4468,12 +4460,28 @@
           <a:p>
             <a:pPr algn="ctr"/>
             <a:r>
-              <a:rPr lang="en-US" smtClean="0">
+              <a:rPr lang="en-US" dirty="0" smtClean="0">
                 <a:solidFill>
                   <a:schemeClr val="tx2"/>
                 </a:solidFill>
               </a:rPr>
-              <a:t>$40,000</a:t>
+              <a:t>2</a:t>
+            </a:r>
+            <a:r>
+              <a:rPr lang="en-US" dirty="0">
+                <a:solidFill>
+                  <a:schemeClr val="tx2"/>
+                </a:solidFill>
+              </a:rPr>
+              <a:t>5</a:t>
+            </a:r>
+            <a:r>
+              <a:rPr lang="en-US" dirty="0" smtClean="0">
+                <a:solidFill>
+                  <a:schemeClr val="tx2"/>
+                </a:solidFill>
+              </a:rPr>
+              <a:t>0</a:t>
             </a:r>
             <a:endParaRPr lang="en-US" dirty="0">
               <a:solidFill>

</xml_diff>

<commit_message>
added graphs and data cleaning script
</commit_message>
<xml_diff>
--- a/images/sketch_of_college_scorecard.pptx
+++ b/images/sketch_of_college_scorecard.pptx
@@ -4742,7 +4742,7 @@
         <p:spPr>
           <a:xfrm>
             <a:off x="767332" y="3243289"/>
-            <a:ext cx="2198294" cy="369332"/>
+            <a:ext cx="1800493" cy="369332"/>
           </a:xfrm>
           <a:prstGeom prst="rect">
             <a:avLst/>
@@ -4760,7 +4760,7 @@
                 <a:ea typeface="Arial" charset="0"/>
                 <a:cs typeface="Arial" charset="0"/>
               </a:rPr>
-              <a:t>Average SAT Score</a:t>
+              <a:t>Admission Rate</a:t>
             </a:r>
             <a:endParaRPr lang="en-US" dirty="0">
               <a:latin typeface="Arial" charset="0"/>
@@ -4901,8 +4901,8 @@
         </p:nvSpPr>
         <p:spPr>
           <a:xfrm>
-            <a:off x="723302" y="3918824"/>
-            <a:ext cx="439544" cy="276999"/>
+            <a:off x="723943" y="3908149"/>
+            <a:ext cx="405880" cy="276999"/>
           </a:xfrm>
           <a:prstGeom prst="rect">
             <a:avLst/>
@@ -4921,7 +4921,7 @@
                 <a:ea typeface="Arial" charset="0"/>
                 <a:cs typeface="Arial" charset="0"/>
               </a:rPr>
-              <a:t>700</a:t>
+              <a:t>0%</a:t>
             </a:r>
             <a:endParaRPr lang="en-US" sz="1200" dirty="0">
               <a:latin typeface="Arial" charset="0"/>
@@ -4939,8 +4939,8 @@
         </p:nvSpPr>
         <p:spPr>
           <a:xfrm>
-            <a:off x="2993803" y="3901845"/>
-            <a:ext cx="524503" cy="276999"/>
+            <a:off x="2984528" y="3913802"/>
+            <a:ext cx="575799" cy="276999"/>
           </a:xfrm>
           <a:prstGeom prst="rect">
             <a:avLst/>
@@ -4959,7 +4959,7 @@
                 <a:ea typeface="Arial" charset="0"/>
                 <a:cs typeface="Arial" charset="0"/>
               </a:rPr>
-              <a:t>1700</a:t>
+              <a:t>100%</a:t>
             </a:r>
             <a:endParaRPr lang="en-US" sz="1200" dirty="0">
               <a:latin typeface="Arial" charset="0"/>
@@ -4977,8 +4977,8 @@
         </p:nvSpPr>
         <p:spPr>
           <a:xfrm>
-            <a:off x="2319298" y="3901845"/>
-            <a:ext cx="524503" cy="276999"/>
+            <a:off x="2391184" y="3913803"/>
+            <a:ext cx="490840" cy="276999"/>
           </a:xfrm>
           <a:prstGeom prst="rect">
             <a:avLst/>
@@ -4997,7 +4997,7 @@
                 <a:ea typeface="Arial" charset="0"/>
                 <a:cs typeface="Arial" charset="0"/>
               </a:rPr>
-              <a:t>1200</a:t>
+              <a:t>75%</a:t>
             </a:r>
             <a:endParaRPr lang="en-US" sz="1200" dirty="0">
               <a:latin typeface="Arial" charset="0"/>
@@ -5015,8 +5015,8 @@
         </p:nvSpPr>
         <p:spPr>
           <a:xfrm>
-            <a:off x="1614014" y="3901845"/>
-            <a:ext cx="524503" cy="276999"/>
+            <a:off x="1348795" y="3901845"/>
+            <a:ext cx="490840" cy="276999"/>
           </a:xfrm>
           <a:prstGeom prst="rect">
             <a:avLst/>
@@ -5035,7 +5035,7 @@
                 <a:ea typeface="Arial" charset="0"/>
                 <a:cs typeface="Arial" charset="0"/>
               </a:rPr>
-              <a:t>1000</a:t>
+              <a:t>25%</a:t>
             </a:r>
             <a:endParaRPr lang="en-US" sz="1200" dirty="0">
               <a:latin typeface="Arial" charset="0"/>

</xml_diff>